<commit_message>
changed a little for ppt
</commit_message>
<xml_diff>
--- a/Presentation_Tweet.pptx
+++ b/Presentation_Tweet.pptx
@@ -116,6 +116,11 @@
       </a:defRPr>
     </a:lvl9pPr>
   </p:defaultTextStyle>
+  <p:extLst>
+    <p:ext uri="{EFAFB233-063F-42B5-8137-9DF3F51BA10A}">
+      <p15:sldGuideLst xmlns:p15="http://schemas.microsoft.com/office/powerpoint/2012/main"/>
+    </p:ext>
+  </p:extLst>
 </p:presentation>
 </file>
 
@@ -9863,7 +9868,7 @@
           <a:noFill/>
           <a:extLst>
             <a:ext uri="{909E8E84-426E-40dd-AFC4-6F175D3DCCD1}">
-              <a14:hiddenFill xmlns:a14="http://schemas.microsoft.com/office/drawing/2010/main" xmlns="">
+              <a14:hiddenFill xmlns="" xmlns:a14="http://schemas.microsoft.com/office/drawing/2010/main">
                 <a:solidFill>
                   <a:srgbClr val="FFFFFF"/>
                 </a:solidFill>
@@ -9923,7 +9928,7 @@
             </a:ln>
             <a:extLst>
               <a:ext uri="{91240B29-F687-4f45-9708-019B960494DF}">
-                <a14:hiddenLine xmlns:a14="http://schemas.microsoft.com/office/drawing/2010/main" xmlns="" w="9525">
+                <a14:hiddenLine xmlns="" xmlns:a14="http://schemas.microsoft.com/office/drawing/2010/main" w="9525">
                   <a:solidFill>
                     <a:srgbClr val="000000"/>
                   </a:solidFill>
@@ -10013,7 +10018,7 @@
             </a:ln>
             <a:extLst>
               <a:ext uri="{91240B29-F687-4f45-9708-019B960494DF}">
-                <a14:hiddenLine xmlns:a14="http://schemas.microsoft.com/office/drawing/2010/main" xmlns="" w="9525">
+                <a14:hiddenLine xmlns="" xmlns:a14="http://schemas.microsoft.com/office/drawing/2010/main" w="9525">
                   <a:solidFill>
                     <a:srgbClr val="000000"/>
                   </a:solidFill>
@@ -10103,7 +10108,7 @@
             </a:ln>
             <a:extLst>
               <a:ext uri="{91240B29-F687-4f45-9708-019B960494DF}">
-                <a14:hiddenLine xmlns:a14="http://schemas.microsoft.com/office/drawing/2010/main" xmlns="" w="9525">
+                <a14:hiddenLine xmlns="" xmlns:a14="http://schemas.microsoft.com/office/drawing/2010/main" w="9525">
                   <a:solidFill>
                     <a:srgbClr val="000000"/>
                   </a:solidFill>
@@ -10137,7 +10142,7 @@
             </a:ln>
             <a:extLst>
               <a:ext uri="{91240B29-F687-4f45-9708-019B960494DF}">
-                <a14:hiddenLine xmlns:a14="http://schemas.microsoft.com/office/drawing/2010/main" xmlns="" w="9525">
+                <a14:hiddenLine xmlns="" xmlns:a14="http://schemas.microsoft.com/office/drawing/2010/main" w="9525">
                   <a:solidFill>
                     <a:srgbClr val="000000"/>
                   </a:solidFill>
@@ -10227,7 +10232,7 @@
             </a:ln>
             <a:extLst>
               <a:ext uri="{91240B29-F687-4f45-9708-019B960494DF}">
-                <a14:hiddenLine xmlns:a14="http://schemas.microsoft.com/office/drawing/2010/main" xmlns="" w="9525">
+                <a14:hiddenLine xmlns="" xmlns:a14="http://schemas.microsoft.com/office/drawing/2010/main" w="9525">
                   <a:solidFill>
                     <a:srgbClr val="000000"/>
                   </a:solidFill>
@@ -10289,7 +10294,7 @@
             </a:ln>
             <a:extLst>
               <a:ext uri="{91240B29-F687-4f45-9708-019B960494DF}">
-                <a14:hiddenLine xmlns:a14="http://schemas.microsoft.com/office/drawing/2010/main" xmlns="" w="9525">
+                <a14:hiddenLine xmlns="" xmlns:a14="http://schemas.microsoft.com/office/drawing/2010/main" w="9525">
                   <a:solidFill>
                     <a:srgbClr val="000000"/>
                   </a:solidFill>
@@ -10351,7 +10356,7 @@
             </a:ln>
             <a:extLst>
               <a:ext uri="{91240B29-F687-4f45-9708-019B960494DF}">
-                <a14:hiddenLine xmlns:a14="http://schemas.microsoft.com/office/drawing/2010/main" xmlns="" w="9525">
+                <a14:hiddenLine xmlns="" xmlns:a14="http://schemas.microsoft.com/office/drawing/2010/main" w="9525">
                   <a:solidFill>
                     <a:srgbClr val="000000"/>
                   </a:solidFill>
@@ -10441,7 +10446,7 @@
             </a:ln>
             <a:extLst>
               <a:ext uri="{91240B29-F687-4f45-9708-019B960494DF}">
-                <a14:hiddenLine xmlns:a14="http://schemas.microsoft.com/office/drawing/2010/main" xmlns="" w="9525">
+                <a14:hiddenLine xmlns="" xmlns:a14="http://schemas.microsoft.com/office/drawing/2010/main" w="9525">
                   <a:solidFill>
                     <a:srgbClr val="000000"/>
                   </a:solidFill>
@@ -10503,7 +10508,7 @@
             </a:ln>
             <a:extLst>
               <a:ext uri="{91240B29-F687-4f45-9708-019B960494DF}">
-                <a14:hiddenLine xmlns:a14="http://schemas.microsoft.com/office/drawing/2010/main" xmlns="" w="9525">
+                <a14:hiddenLine xmlns="" xmlns:a14="http://schemas.microsoft.com/office/drawing/2010/main" w="9525">
                   <a:solidFill>
                     <a:srgbClr val="000000"/>
                   </a:solidFill>
@@ -10565,7 +10570,7 @@
             </a:ln>
             <a:extLst>
               <a:ext uri="{91240B29-F687-4f45-9708-019B960494DF}">
-                <a14:hiddenLine xmlns:a14="http://schemas.microsoft.com/office/drawing/2010/main" xmlns="" w="9525">
+                <a14:hiddenLine xmlns="" xmlns:a14="http://schemas.microsoft.com/office/drawing/2010/main" w="9525">
                   <a:solidFill>
                     <a:srgbClr val="000000"/>
                   </a:solidFill>
@@ -10655,7 +10660,7 @@
             </a:ln>
             <a:extLst>
               <a:ext uri="{91240B29-F687-4f45-9708-019B960494DF}">
-                <a14:hiddenLine xmlns:a14="http://schemas.microsoft.com/office/drawing/2010/main" xmlns="" w="9525">
+                <a14:hiddenLine xmlns="" xmlns:a14="http://schemas.microsoft.com/office/drawing/2010/main" w="9525">
                   <a:solidFill>
                     <a:srgbClr val="000000"/>
                   </a:solidFill>
@@ -10745,7 +10750,7 @@
             </a:ln>
             <a:extLst>
               <a:ext uri="{91240B29-F687-4f45-9708-019B960494DF}">
-                <a14:hiddenLine xmlns:a14="http://schemas.microsoft.com/office/drawing/2010/main" xmlns="" w="9525">
+                <a14:hiddenLine xmlns="" xmlns:a14="http://schemas.microsoft.com/office/drawing/2010/main" w="9525">
                   <a:solidFill>
                     <a:srgbClr val="000000"/>
                   </a:solidFill>
@@ -10807,7 +10812,7 @@
             </a:ln>
             <a:extLst>
               <a:ext uri="{91240B29-F687-4f45-9708-019B960494DF}">
-                <a14:hiddenLine xmlns:a14="http://schemas.microsoft.com/office/drawing/2010/main" xmlns="" w="9525">
+                <a14:hiddenLine xmlns="" xmlns:a14="http://schemas.microsoft.com/office/drawing/2010/main" w="9525">
                   <a:solidFill>
                     <a:srgbClr val="000000"/>
                   </a:solidFill>
@@ -10917,7 +10922,7 @@
             </a:ln>
             <a:extLst>
               <a:ext uri="{91240B29-F687-4f45-9708-019B960494DF}">
-                <a14:hiddenLine xmlns:a14="http://schemas.microsoft.com/office/drawing/2010/main" xmlns="" w="9525">
+                <a14:hiddenLine xmlns="" xmlns:a14="http://schemas.microsoft.com/office/drawing/2010/main" w="9525">
                   <a:solidFill>
                     <a:srgbClr val="000000"/>
                   </a:solidFill>
@@ -10979,7 +10984,7 @@
             </a:ln>
             <a:extLst>
               <a:ext uri="{91240B29-F687-4f45-9708-019B960494DF}">
-                <a14:hiddenLine xmlns:a14="http://schemas.microsoft.com/office/drawing/2010/main" xmlns="" w="9525">
+                <a14:hiddenLine xmlns="" xmlns:a14="http://schemas.microsoft.com/office/drawing/2010/main" w="9525">
                   <a:solidFill>
                     <a:srgbClr val="000000"/>
                   </a:solidFill>
@@ -11069,7 +11074,7 @@
             </a:ln>
             <a:extLst>
               <a:ext uri="{91240B29-F687-4f45-9708-019B960494DF}">
-                <a14:hiddenLine xmlns:a14="http://schemas.microsoft.com/office/drawing/2010/main" xmlns="" w="9525">
+                <a14:hiddenLine xmlns="" xmlns:a14="http://schemas.microsoft.com/office/drawing/2010/main" w="9525">
                   <a:solidFill>
                     <a:srgbClr val="000000"/>
                   </a:solidFill>
@@ -11159,7 +11164,7 @@
             </a:ln>
             <a:extLst>
               <a:ext uri="{91240B29-F687-4f45-9708-019B960494DF}">
-                <a14:hiddenLine xmlns:a14="http://schemas.microsoft.com/office/drawing/2010/main" xmlns="" w="9525">
+                <a14:hiddenLine xmlns="" xmlns:a14="http://schemas.microsoft.com/office/drawing/2010/main" w="9525">
                   <a:solidFill>
                     <a:srgbClr val="000000"/>
                   </a:solidFill>
@@ -11221,7 +11226,7 @@
             </a:ln>
             <a:extLst>
               <a:ext uri="{91240B29-F687-4f45-9708-019B960494DF}">
-                <a14:hiddenLine xmlns:a14="http://schemas.microsoft.com/office/drawing/2010/main" xmlns="" w="9525">
+                <a14:hiddenLine xmlns="" xmlns:a14="http://schemas.microsoft.com/office/drawing/2010/main" w="9525">
                   <a:solidFill>
                     <a:srgbClr val="000000"/>
                   </a:solidFill>
@@ -11311,7 +11316,7 @@
             </a:ln>
             <a:extLst>
               <a:ext uri="{91240B29-F687-4f45-9708-019B960494DF}">
-                <a14:hiddenLine xmlns:a14="http://schemas.microsoft.com/office/drawing/2010/main" xmlns="" w="9525">
+                <a14:hiddenLine xmlns="" xmlns:a14="http://schemas.microsoft.com/office/drawing/2010/main" w="9525">
                   <a:solidFill>
                     <a:srgbClr val="000000"/>
                   </a:solidFill>
@@ -11401,7 +11406,7 @@
             </a:ln>
             <a:extLst>
               <a:ext uri="{91240B29-F687-4f45-9708-019B960494DF}">
-                <a14:hiddenLine xmlns:a14="http://schemas.microsoft.com/office/drawing/2010/main" xmlns="" w="9525">
+                <a14:hiddenLine xmlns="" xmlns:a14="http://schemas.microsoft.com/office/drawing/2010/main" w="9525">
                   <a:solidFill>
                     <a:srgbClr val="000000"/>
                   </a:solidFill>
@@ -11457,7 +11462,7 @@
             </a:ln>
             <a:extLst>
               <a:ext uri="{91240B29-F687-4f45-9708-019B960494DF}">
-                <a14:hiddenLine xmlns:a14="http://schemas.microsoft.com/office/drawing/2010/main" xmlns="" w="9525">
+                <a14:hiddenLine xmlns="" xmlns:a14="http://schemas.microsoft.com/office/drawing/2010/main" w="9525">
                   <a:solidFill>
                     <a:srgbClr val="000000"/>
                   </a:solidFill>
@@ -11547,7 +11552,7 @@
             </a:ln>
             <a:extLst>
               <a:ext uri="{91240B29-F687-4f45-9708-019B960494DF}">
-                <a14:hiddenLine xmlns:a14="http://schemas.microsoft.com/office/drawing/2010/main" xmlns="" w="9525">
+                <a14:hiddenLine xmlns="" xmlns:a14="http://schemas.microsoft.com/office/drawing/2010/main" w="9525">
                   <a:solidFill>
                     <a:srgbClr val="000000"/>
                   </a:solidFill>
@@ -11603,7 +11608,7 @@
             </a:ln>
             <a:extLst>
               <a:ext uri="{91240B29-F687-4f45-9708-019B960494DF}">
-                <a14:hiddenLine xmlns:a14="http://schemas.microsoft.com/office/drawing/2010/main" xmlns="" w="9525">
+                <a14:hiddenLine xmlns="" xmlns:a14="http://schemas.microsoft.com/office/drawing/2010/main" w="9525">
                   <a:solidFill>
                     <a:srgbClr val="000000"/>
                   </a:solidFill>
@@ -11693,7 +11698,7 @@
             </a:ln>
             <a:extLst>
               <a:ext uri="{91240B29-F687-4f45-9708-019B960494DF}">
-                <a14:hiddenLine xmlns:a14="http://schemas.microsoft.com/office/drawing/2010/main" xmlns="" w="9525">
+                <a14:hiddenLine xmlns="" xmlns:a14="http://schemas.microsoft.com/office/drawing/2010/main" w="9525">
                   <a:solidFill>
                     <a:srgbClr val="000000"/>
                   </a:solidFill>
@@ -11761,7 +11766,7 @@
             </a:ln>
             <a:extLst>
               <a:ext uri="{91240B29-F687-4f45-9708-019B960494DF}">
-                <a14:hiddenLine xmlns:a14="http://schemas.microsoft.com/office/drawing/2010/main" xmlns="" w="9525">
+                <a14:hiddenLine xmlns="" xmlns:a14="http://schemas.microsoft.com/office/drawing/2010/main" w="9525">
                   <a:solidFill>
                     <a:srgbClr val="000000"/>
                   </a:solidFill>
@@ -11851,7 +11856,7 @@
             </a:ln>
             <a:extLst>
               <a:ext uri="{91240B29-F687-4f45-9708-019B960494DF}">
-                <a14:hiddenLine xmlns:a14="http://schemas.microsoft.com/office/drawing/2010/main" xmlns="" w="9525">
+                <a14:hiddenLine xmlns="" xmlns:a14="http://schemas.microsoft.com/office/drawing/2010/main" w="9525">
                   <a:solidFill>
                     <a:srgbClr val="000000"/>
                   </a:solidFill>
@@ -11919,7 +11924,7 @@
             </a:ln>
             <a:extLst>
               <a:ext uri="{91240B29-F687-4f45-9708-019B960494DF}">
-                <a14:hiddenLine xmlns:a14="http://schemas.microsoft.com/office/drawing/2010/main" xmlns="" w="9525">
+                <a14:hiddenLine xmlns="" xmlns:a14="http://schemas.microsoft.com/office/drawing/2010/main" w="9525">
                   <a:solidFill>
                     <a:srgbClr val="000000"/>
                   </a:solidFill>
@@ -12009,7 +12014,7 @@
             </a:ln>
             <a:extLst>
               <a:ext uri="{91240B29-F687-4f45-9708-019B960494DF}">
-                <a14:hiddenLine xmlns:a14="http://schemas.microsoft.com/office/drawing/2010/main" xmlns="" w="9525">
+                <a14:hiddenLine xmlns="" xmlns:a14="http://schemas.microsoft.com/office/drawing/2010/main" w="9525">
                   <a:solidFill>
                     <a:srgbClr val="000000"/>
                   </a:solidFill>
@@ -12043,7 +12048,7 @@
             </a:ln>
             <a:extLst>
               <a:ext uri="{91240B29-F687-4f45-9708-019B960494DF}">
-                <a14:hiddenLine xmlns:a14="http://schemas.microsoft.com/office/drawing/2010/main" xmlns="" w="9525">
+                <a14:hiddenLine xmlns="" xmlns:a14="http://schemas.microsoft.com/office/drawing/2010/main" w="9525">
                   <a:solidFill>
                     <a:srgbClr val="000000"/>
                   </a:solidFill>
@@ -12133,7 +12138,7 @@
             </a:ln>
             <a:extLst>
               <a:ext uri="{91240B29-F687-4f45-9708-019B960494DF}">
-                <a14:hiddenLine xmlns:a14="http://schemas.microsoft.com/office/drawing/2010/main" xmlns="" w="9525">
+                <a14:hiddenLine xmlns="" xmlns:a14="http://schemas.microsoft.com/office/drawing/2010/main" w="9525">
                   <a:solidFill>
                     <a:srgbClr val="000000"/>
                   </a:solidFill>
@@ -12195,7 +12200,7 @@
             </a:ln>
             <a:extLst>
               <a:ext uri="{91240B29-F687-4f45-9708-019B960494DF}">
-                <a14:hiddenLine xmlns:a14="http://schemas.microsoft.com/office/drawing/2010/main" xmlns="" w="9525">
+                <a14:hiddenLine xmlns="" xmlns:a14="http://schemas.microsoft.com/office/drawing/2010/main" w="9525">
                   <a:solidFill>
                     <a:srgbClr val="000000"/>
                   </a:solidFill>
@@ -12257,7 +12262,7 @@
             </a:ln>
             <a:extLst>
               <a:ext uri="{91240B29-F687-4f45-9708-019B960494DF}">
-                <a14:hiddenLine xmlns:a14="http://schemas.microsoft.com/office/drawing/2010/main" xmlns="" w="9525">
+                <a14:hiddenLine xmlns="" xmlns:a14="http://schemas.microsoft.com/office/drawing/2010/main" w="9525">
                   <a:solidFill>
                     <a:srgbClr val="000000"/>
                   </a:solidFill>
@@ -12347,7 +12352,7 @@
             </a:ln>
             <a:extLst>
               <a:ext uri="{91240B29-F687-4f45-9708-019B960494DF}">
-                <a14:hiddenLine xmlns:a14="http://schemas.microsoft.com/office/drawing/2010/main" xmlns="" w="9525">
+                <a14:hiddenLine xmlns="" xmlns:a14="http://schemas.microsoft.com/office/drawing/2010/main" w="9525">
                   <a:solidFill>
                     <a:srgbClr val="000000"/>
                   </a:solidFill>
@@ -12415,7 +12420,7 @@
             </a:ln>
             <a:extLst>
               <a:ext uri="{91240B29-F687-4f45-9708-019B960494DF}">
-                <a14:hiddenLine xmlns:a14="http://schemas.microsoft.com/office/drawing/2010/main" xmlns="" w="9525">
+                <a14:hiddenLine xmlns="" xmlns:a14="http://schemas.microsoft.com/office/drawing/2010/main" w="9525">
                   <a:solidFill>
                     <a:srgbClr val="000000"/>
                   </a:solidFill>
@@ -12477,7 +12482,7 @@
             </a:ln>
             <a:extLst>
               <a:ext uri="{91240B29-F687-4f45-9708-019B960494DF}">
-                <a14:hiddenLine xmlns:a14="http://schemas.microsoft.com/office/drawing/2010/main" xmlns="" w="9525">
+                <a14:hiddenLine xmlns="" xmlns:a14="http://schemas.microsoft.com/office/drawing/2010/main" w="9525">
                   <a:solidFill>
                     <a:srgbClr val="000000"/>
                   </a:solidFill>
@@ -12567,7 +12572,7 @@
             </a:ln>
             <a:extLst>
               <a:ext uri="{91240B29-F687-4f45-9708-019B960494DF}">
-                <a14:hiddenLine xmlns:a14="http://schemas.microsoft.com/office/drawing/2010/main" xmlns="" w="9525">
+                <a14:hiddenLine xmlns="" xmlns:a14="http://schemas.microsoft.com/office/drawing/2010/main" w="9525">
                   <a:solidFill>
                     <a:srgbClr val="000000"/>
                   </a:solidFill>
@@ -12629,7 +12634,7 @@
             </a:ln>
             <a:extLst>
               <a:ext uri="{91240B29-F687-4f45-9708-019B960494DF}">
-                <a14:hiddenLine xmlns:a14="http://schemas.microsoft.com/office/drawing/2010/main" xmlns="" w="9525">
+                <a14:hiddenLine xmlns="" xmlns:a14="http://schemas.microsoft.com/office/drawing/2010/main" w="9525">
                   <a:solidFill>
                     <a:srgbClr val="000000"/>
                   </a:solidFill>
@@ -12719,7 +12724,7 @@
             </a:ln>
             <a:extLst>
               <a:ext uri="{91240B29-F687-4f45-9708-019B960494DF}">
-                <a14:hiddenLine xmlns:a14="http://schemas.microsoft.com/office/drawing/2010/main" xmlns="" w="9525">
+                <a14:hiddenLine xmlns="" xmlns:a14="http://schemas.microsoft.com/office/drawing/2010/main" w="9525">
                   <a:solidFill>
                     <a:srgbClr val="000000"/>
                   </a:solidFill>
@@ -12781,7 +12786,7 @@
             </a:ln>
             <a:extLst>
               <a:ext uri="{91240B29-F687-4f45-9708-019B960494DF}">
-                <a14:hiddenLine xmlns:a14="http://schemas.microsoft.com/office/drawing/2010/main" xmlns="" w="9525">
+                <a14:hiddenLine xmlns="" xmlns:a14="http://schemas.microsoft.com/office/drawing/2010/main" w="9525">
                   <a:solidFill>
                     <a:srgbClr val="000000"/>
                   </a:solidFill>
@@ -12871,7 +12876,7 @@
             </a:ln>
             <a:extLst>
               <a:ext uri="{91240B29-F687-4f45-9708-019B960494DF}">
-                <a14:hiddenLine xmlns:a14="http://schemas.microsoft.com/office/drawing/2010/main" xmlns="" w="9525">
+                <a14:hiddenLine xmlns="" xmlns:a14="http://schemas.microsoft.com/office/drawing/2010/main" w="9525">
                   <a:solidFill>
                     <a:srgbClr val="000000"/>
                   </a:solidFill>
@@ -12905,7 +12910,7 @@
             </a:ln>
             <a:extLst>
               <a:ext uri="{91240B29-F687-4f45-9708-019B960494DF}">
-                <a14:hiddenLine xmlns:a14="http://schemas.microsoft.com/office/drawing/2010/main" xmlns="" w="9525">
+                <a14:hiddenLine xmlns="" xmlns:a14="http://schemas.microsoft.com/office/drawing/2010/main" w="9525">
                   <a:solidFill>
                     <a:srgbClr val="000000"/>
                   </a:solidFill>
@@ -12970,7 +12975,7 @@
             </a:ln>
             <a:extLst>
               <a:ext uri="{91240B29-F687-4f45-9708-019B960494DF}">
-                <a14:hiddenLine xmlns:a14="http://schemas.microsoft.com/office/drawing/2010/main" xmlns="" w="9525">
+                <a14:hiddenLine xmlns="" xmlns:a14="http://schemas.microsoft.com/office/drawing/2010/main" w="9525">
                   <a:solidFill>
                     <a:srgbClr val="000000"/>
                   </a:solidFill>
@@ -13060,7 +13065,7 @@
             </a:ln>
             <a:extLst>
               <a:ext uri="{91240B29-F687-4f45-9708-019B960494DF}">
-                <a14:hiddenLine xmlns:a14="http://schemas.microsoft.com/office/drawing/2010/main" xmlns="" w="9525">
+                <a14:hiddenLine xmlns="" xmlns:a14="http://schemas.microsoft.com/office/drawing/2010/main" w="9525">
                   <a:solidFill>
                     <a:srgbClr val="000000"/>
                   </a:solidFill>
@@ -13122,7 +13127,7 @@
             </a:ln>
             <a:extLst>
               <a:ext uri="{91240B29-F687-4f45-9708-019B960494DF}">
-                <a14:hiddenLine xmlns:a14="http://schemas.microsoft.com/office/drawing/2010/main" xmlns="" w="9525">
+                <a14:hiddenLine xmlns="" xmlns:a14="http://schemas.microsoft.com/office/drawing/2010/main" w="9525">
                   <a:solidFill>
                     <a:srgbClr val="000000"/>
                   </a:solidFill>
@@ -13212,7 +13217,7 @@
             </a:ln>
             <a:extLst>
               <a:ext uri="{91240B29-F687-4f45-9708-019B960494DF}">
-                <a14:hiddenLine xmlns:a14="http://schemas.microsoft.com/office/drawing/2010/main" xmlns="" w="9525">
+                <a14:hiddenLine xmlns="" xmlns:a14="http://schemas.microsoft.com/office/drawing/2010/main" w="9525">
                   <a:solidFill>
                     <a:srgbClr val="000000"/>
                   </a:solidFill>
@@ -13302,7 +13307,7 @@
             </a:ln>
             <a:extLst>
               <a:ext uri="{91240B29-F687-4f45-9708-019B960494DF}">
-                <a14:hiddenLine xmlns:a14="http://schemas.microsoft.com/office/drawing/2010/main" xmlns="" w="9525">
+                <a14:hiddenLine xmlns="" xmlns:a14="http://schemas.microsoft.com/office/drawing/2010/main" w="9525">
                   <a:solidFill>
                     <a:srgbClr val="000000"/>
                   </a:solidFill>
@@ -13367,7 +13372,7 @@
             </a:ln>
             <a:extLst>
               <a:ext uri="{91240B29-F687-4f45-9708-019B960494DF}">
-                <a14:hiddenLine xmlns:a14="http://schemas.microsoft.com/office/drawing/2010/main" xmlns="" w="9525">
+                <a14:hiddenLine xmlns="" xmlns:a14="http://schemas.microsoft.com/office/drawing/2010/main" w="9525">
                   <a:solidFill>
                     <a:srgbClr val="000000"/>
                   </a:solidFill>
@@ -13429,7 +13434,7 @@
             </a:ln>
             <a:extLst>
               <a:ext uri="{91240B29-F687-4f45-9708-019B960494DF}">
-                <a14:hiddenLine xmlns:a14="http://schemas.microsoft.com/office/drawing/2010/main" xmlns="" w="9525">
+                <a14:hiddenLine xmlns="" xmlns:a14="http://schemas.microsoft.com/office/drawing/2010/main" w="9525">
                   <a:solidFill>
                     <a:srgbClr val="000000"/>
                   </a:solidFill>
@@ -13519,7 +13524,7 @@
             </a:ln>
             <a:extLst>
               <a:ext uri="{91240B29-F687-4f45-9708-019B960494DF}">
-                <a14:hiddenLine xmlns:a14="http://schemas.microsoft.com/office/drawing/2010/main" xmlns="" w="9525">
+                <a14:hiddenLine xmlns="" xmlns:a14="http://schemas.microsoft.com/office/drawing/2010/main" w="9525">
                   <a:solidFill>
                     <a:srgbClr val="000000"/>
                   </a:solidFill>
@@ -13609,7 +13614,7 @@
             </a:ln>
             <a:extLst>
               <a:ext uri="{91240B29-F687-4f45-9708-019B960494DF}">
-                <a14:hiddenLine xmlns:a14="http://schemas.microsoft.com/office/drawing/2010/main" xmlns="" w="9525">
+                <a14:hiddenLine xmlns="" xmlns:a14="http://schemas.microsoft.com/office/drawing/2010/main" w="9525">
                   <a:solidFill>
                     <a:srgbClr val="000000"/>
                   </a:solidFill>
@@ -13671,7 +13676,7 @@
             </a:ln>
             <a:extLst>
               <a:ext uri="{91240B29-F687-4f45-9708-019B960494DF}">
-                <a14:hiddenLine xmlns:a14="http://schemas.microsoft.com/office/drawing/2010/main" xmlns="" w="9525">
+                <a14:hiddenLine xmlns="" xmlns:a14="http://schemas.microsoft.com/office/drawing/2010/main" w="9525">
                   <a:solidFill>
                     <a:srgbClr val="000000"/>
                   </a:solidFill>
@@ -13791,7 +13796,7 @@
             </a:ln>
             <a:extLst>
               <a:ext uri="{91240B29-F687-4f45-9708-019B960494DF}">
-                <a14:hiddenLine xmlns:a14="http://schemas.microsoft.com/office/drawing/2010/main" xmlns="" w="9525">
+                <a14:hiddenLine xmlns="" xmlns:a14="http://schemas.microsoft.com/office/drawing/2010/main" w="9525">
                   <a:solidFill>
                     <a:srgbClr val="000000"/>
                   </a:solidFill>
@@ -13859,7 +13864,7 @@
             </a:ln>
             <a:extLst>
               <a:ext uri="{91240B29-F687-4f45-9708-019B960494DF}">
-                <a14:hiddenLine xmlns:a14="http://schemas.microsoft.com/office/drawing/2010/main" xmlns="" w="9525">
+                <a14:hiddenLine xmlns="" xmlns:a14="http://schemas.microsoft.com/office/drawing/2010/main" w="9525">
                   <a:solidFill>
                     <a:srgbClr val="000000"/>
                   </a:solidFill>
@@ -13949,7 +13954,7 @@
             </a:ln>
             <a:extLst>
               <a:ext uri="{91240B29-F687-4f45-9708-019B960494DF}">
-                <a14:hiddenLine xmlns:a14="http://schemas.microsoft.com/office/drawing/2010/main" xmlns="" w="9525">
+                <a14:hiddenLine xmlns="" xmlns:a14="http://schemas.microsoft.com/office/drawing/2010/main" w="9525">
                   <a:solidFill>
                     <a:srgbClr val="000000"/>
                   </a:solidFill>
@@ -18671,7 +18676,7 @@
           <a:noFill/>
           <a:extLst>
             <a:ext uri="{909E8E84-426E-40dd-AFC4-6F175D3DCCD1}">
-              <a14:hiddenFill xmlns:a14="http://schemas.microsoft.com/office/drawing/2010/main" xmlns="">
+              <a14:hiddenFill xmlns="" xmlns:a14="http://schemas.microsoft.com/office/drawing/2010/main">
                 <a:solidFill>
                   <a:srgbClr val="FFFFFF"/>
                 </a:solidFill>
@@ -18745,7 +18750,7 @@
               </a:ln>
               <a:extLst>
                 <a:ext uri="{91240B29-F687-4f45-9708-019B960494DF}">
-                  <a14:hiddenLine xmlns:a14="http://schemas.microsoft.com/office/drawing/2010/main" xmlns="" w="9525">
+                  <a14:hiddenLine xmlns="" xmlns:a14="http://schemas.microsoft.com/office/drawing/2010/main" w="9525">
                     <a:solidFill>
                       <a:srgbClr val="000000"/>
                     </a:solidFill>
@@ -18835,7 +18840,7 @@
               </a:ln>
               <a:extLst>
                 <a:ext uri="{91240B29-F687-4f45-9708-019B960494DF}">
-                  <a14:hiddenLine xmlns:a14="http://schemas.microsoft.com/office/drawing/2010/main" xmlns="" w="9525">
+                  <a14:hiddenLine xmlns="" xmlns:a14="http://schemas.microsoft.com/office/drawing/2010/main" w="9525">
                     <a:solidFill>
                       <a:srgbClr val="000000"/>
                     </a:solidFill>
@@ -18925,7 +18930,7 @@
               </a:ln>
               <a:extLst>
                 <a:ext uri="{91240B29-F687-4f45-9708-019B960494DF}">
-                  <a14:hiddenLine xmlns:a14="http://schemas.microsoft.com/office/drawing/2010/main" xmlns="" w="9525">
+                  <a14:hiddenLine xmlns="" xmlns:a14="http://schemas.microsoft.com/office/drawing/2010/main" w="9525">
                     <a:solidFill>
                       <a:srgbClr val="000000"/>
                     </a:solidFill>
@@ -18987,7 +18992,7 @@
               </a:ln>
               <a:extLst>
                 <a:ext uri="{91240B29-F687-4f45-9708-019B960494DF}">
-                  <a14:hiddenLine xmlns:a14="http://schemas.microsoft.com/office/drawing/2010/main" xmlns="" w="9525">
+                  <a14:hiddenLine xmlns="" xmlns:a14="http://schemas.microsoft.com/office/drawing/2010/main" w="9525">
                     <a:solidFill>
                       <a:srgbClr val="000000"/>
                     </a:solidFill>
@@ -19077,7 +19082,7 @@
               </a:ln>
               <a:extLst>
                 <a:ext uri="{91240B29-F687-4f45-9708-019B960494DF}">
-                  <a14:hiddenLine xmlns:a14="http://schemas.microsoft.com/office/drawing/2010/main" xmlns="" w="9525">
+                  <a14:hiddenLine xmlns="" xmlns:a14="http://schemas.microsoft.com/office/drawing/2010/main" w="9525">
                     <a:solidFill>
                       <a:srgbClr val="000000"/>
                     </a:solidFill>
@@ -19139,7 +19144,7 @@
               </a:ln>
               <a:extLst>
                 <a:ext uri="{91240B29-F687-4f45-9708-019B960494DF}">
-                  <a14:hiddenLine xmlns:a14="http://schemas.microsoft.com/office/drawing/2010/main" xmlns="" w="9525">
+                  <a14:hiddenLine xmlns="" xmlns:a14="http://schemas.microsoft.com/office/drawing/2010/main" w="9525">
                     <a:solidFill>
                       <a:srgbClr val="000000"/>
                     </a:solidFill>
@@ -19201,7 +19206,7 @@
               </a:ln>
               <a:extLst>
                 <a:ext uri="{91240B29-F687-4f45-9708-019B960494DF}">
-                  <a14:hiddenLine xmlns:a14="http://schemas.microsoft.com/office/drawing/2010/main" xmlns="" w="9525">
+                  <a14:hiddenLine xmlns="" xmlns:a14="http://schemas.microsoft.com/office/drawing/2010/main" w="9525">
                     <a:solidFill>
                       <a:srgbClr val="000000"/>
                     </a:solidFill>
@@ -19291,7 +19296,7 @@
               </a:ln>
               <a:extLst>
                 <a:ext uri="{91240B29-F687-4f45-9708-019B960494DF}">
-                  <a14:hiddenLine xmlns:a14="http://schemas.microsoft.com/office/drawing/2010/main" xmlns="" w="9525">
+                  <a14:hiddenLine xmlns="" xmlns:a14="http://schemas.microsoft.com/office/drawing/2010/main" w="9525">
                     <a:solidFill>
                       <a:srgbClr val="000000"/>
                     </a:solidFill>
@@ -19381,7 +19386,7 @@
               </a:ln>
               <a:extLst>
                 <a:ext uri="{91240B29-F687-4f45-9708-019B960494DF}">
-                  <a14:hiddenLine xmlns:a14="http://schemas.microsoft.com/office/drawing/2010/main" xmlns="" w="9525">
+                  <a14:hiddenLine xmlns="" xmlns:a14="http://schemas.microsoft.com/office/drawing/2010/main" w="9525">
                     <a:solidFill>
                       <a:srgbClr val="000000"/>
                     </a:solidFill>
@@ -19443,7 +19448,7 @@
               </a:ln>
               <a:extLst>
                 <a:ext uri="{91240B29-F687-4f45-9708-019B960494DF}">
-                  <a14:hiddenLine xmlns:a14="http://schemas.microsoft.com/office/drawing/2010/main" xmlns="" w="9525">
+                  <a14:hiddenLine xmlns="" xmlns:a14="http://schemas.microsoft.com/office/drawing/2010/main" w="9525">
                     <a:solidFill>
                       <a:srgbClr val="000000"/>
                     </a:solidFill>
@@ -19553,7 +19558,7 @@
               </a:ln>
               <a:extLst>
                 <a:ext uri="{91240B29-F687-4f45-9708-019B960494DF}">
-                  <a14:hiddenLine xmlns:a14="http://schemas.microsoft.com/office/drawing/2010/main" xmlns="" w="9525">
+                  <a14:hiddenLine xmlns="" xmlns:a14="http://schemas.microsoft.com/office/drawing/2010/main" w="9525">
                     <a:solidFill>
                       <a:srgbClr val="000000"/>
                     </a:solidFill>
@@ -19637,7 +19642,7 @@
               </a:ln>
               <a:extLst>
                 <a:ext uri="{91240B29-F687-4f45-9708-019B960494DF}">
-                  <a14:hiddenLine xmlns:a14="http://schemas.microsoft.com/office/drawing/2010/main" xmlns="" w="9525">
+                  <a14:hiddenLine xmlns="" xmlns:a14="http://schemas.microsoft.com/office/drawing/2010/main" w="9525">
                     <a:solidFill>
                       <a:srgbClr val="000000"/>
                     </a:solidFill>
@@ -19699,7 +19704,7 @@
               </a:ln>
               <a:extLst>
                 <a:ext uri="{91240B29-F687-4f45-9708-019B960494DF}">
-                  <a14:hiddenLine xmlns:a14="http://schemas.microsoft.com/office/drawing/2010/main" xmlns="" w="9525">
+                  <a14:hiddenLine xmlns="" xmlns:a14="http://schemas.microsoft.com/office/drawing/2010/main" w="9525">
                     <a:solidFill>
                       <a:srgbClr val="000000"/>
                     </a:solidFill>
@@ -19761,7 +19766,7 @@
               </a:ln>
               <a:extLst>
                 <a:ext uri="{91240B29-F687-4f45-9708-019B960494DF}">
-                  <a14:hiddenLine xmlns:a14="http://schemas.microsoft.com/office/drawing/2010/main" xmlns="" w="9525">
+                  <a14:hiddenLine xmlns="" xmlns:a14="http://schemas.microsoft.com/office/drawing/2010/main" w="9525">
                     <a:solidFill>
                       <a:srgbClr val="000000"/>
                     </a:solidFill>
@@ -19851,7 +19856,7 @@
               </a:ln>
               <a:extLst>
                 <a:ext uri="{91240B29-F687-4f45-9708-019B960494DF}">
-                  <a14:hiddenLine xmlns:a14="http://schemas.microsoft.com/office/drawing/2010/main" xmlns="" w="9525">
+                  <a14:hiddenLine xmlns="" xmlns:a14="http://schemas.microsoft.com/office/drawing/2010/main" w="9525">
                     <a:solidFill>
                       <a:srgbClr val="000000"/>
                     </a:solidFill>
@@ -19885,7 +19890,7 @@
               </a:ln>
               <a:extLst>
                 <a:ext uri="{91240B29-F687-4f45-9708-019B960494DF}">
-                  <a14:hiddenLine xmlns:a14="http://schemas.microsoft.com/office/drawing/2010/main" xmlns="" w="9525">
+                  <a14:hiddenLine xmlns="" xmlns:a14="http://schemas.microsoft.com/office/drawing/2010/main" w="9525">
                     <a:solidFill>
                       <a:srgbClr val="000000"/>
                     </a:solidFill>
@@ -19950,7 +19955,7 @@
               </a:ln>
               <a:extLst>
                 <a:ext uri="{91240B29-F687-4f45-9708-019B960494DF}">
-                  <a14:hiddenLine xmlns:a14="http://schemas.microsoft.com/office/drawing/2010/main" xmlns="" w="9525">
+                  <a14:hiddenLine xmlns="" xmlns:a14="http://schemas.microsoft.com/office/drawing/2010/main" w="9525">
                     <a:solidFill>
                       <a:srgbClr val="000000"/>
                     </a:solidFill>
@@ -20040,7 +20045,7 @@
               </a:ln>
               <a:extLst>
                 <a:ext uri="{91240B29-F687-4f45-9708-019B960494DF}">
-                  <a14:hiddenLine xmlns:a14="http://schemas.microsoft.com/office/drawing/2010/main" xmlns="" w="9525">
+                  <a14:hiddenLine xmlns="" xmlns:a14="http://schemas.microsoft.com/office/drawing/2010/main" w="9525">
                     <a:solidFill>
                       <a:srgbClr val="000000"/>
                     </a:solidFill>
@@ -20102,7 +20107,7 @@
               </a:ln>
               <a:extLst>
                 <a:ext uri="{91240B29-F687-4f45-9708-019B960494DF}">
-                  <a14:hiddenLine xmlns:a14="http://schemas.microsoft.com/office/drawing/2010/main" xmlns="" w="9525">
+                  <a14:hiddenLine xmlns="" xmlns:a14="http://schemas.microsoft.com/office/drawing/2010/main" w="9525">
                     <a:solidFill>
                       <a:srgbClr val="000000"/>
                     </a:solidFill>
@@ -20192,7 +20197,7 @@
               </a:ln>
               <a:extLst>
                 <a:ext uri="{91240B29-F687-4f45-9708-019B960494DF}">
-                  <a14:hiddenLine xmlns:a14="http://schemas.microsoft.com/office/drawing/2010/main" xmlns="" w="9525">
+                  <a14:hiddenLine xmlns="" xmlns:a14="http://schemas.microsoft.com/office/drawing/2010/main" w="9525">
                     <a:solidFill>
                       <a:srgbClr val="000000"/>
                     </a:solidFill>
@@ -20257,7 +20262,7 @@
               </a:ln>
               <a:extLst>
                 <a:ext uri="{91240B29-F687-4f45-9708-019B960494DF}">
-                  <a14:hiddenLine xmlns:a14="http://schemas.microsoft.com/office/drawing/2010/main" xmlns="" w="9525">
+                  <a14:hiddenLine xmlns="" xmlns:a14="http://schemas.microsoft.com/office/drawing/2010/main" w="9525">
                     <a:solidFill>
                       <a:srgbClr val="000000"/>
                     </a:solidFill>
@@ -20319,7 +20324,7 @@
               </a:ln>
               <a:extLst>
                 <a:ext uri="{91240B29-F687-4f45-9708-019B960494DF}">
-                  <a14:hiddenLine xmlns:a14="http://schemas.microsoft.com/office/drawing/2010/main" xmlns="" w="9525">
+                  <a14:hiddenLine xmlns="" xmlns:a14="http://schemas.microsoft.com/office/drawing/2010/main" w="9525">
                     <a:solidFill>
                       <a:srgbClr val="000000"/>
                     </a:solidFill>
@@ -20409,7 +20414,7 @@
               </a:ln>
               <a:extLst>
                 <a:ext uri="{91240B29-F687-4f45-9708-019B960494DF}">
-                  <a14:hiddenLine xmlns:a14="http://schemas.microsoft.com/office/drawing/2010/main" xmlns="" w="9525">
+                  <a14:hiddenLine xmlns="" xmlns:a14="http://schemas.microsoft.com/office/drawing/2010/main" w="9525">
                     <a:solidFill>
                       <a:srgbClr val="000000"/>
                     </a:solidFill>
@@ -20499,7 +20504,7 @@
               </a:ln>
               <a:extLst>
                 <a:ext uri="{91240B29-F687-4f45-9708-019B960494DF}">
-                  <a14:hiddenLine xmlns:a14="http://schemas.microsoft.com/office/drawing/2010/main" xmlns="" w="9525">
+                  <a14:hiddenLine xmlns="" xmlns:a14="http://schemas.microsoft.com/office/drawing/2010/main" w="9525">
                     <a:solidFill>
                       <a:srgbClr val="000000"/>
                     </a:solidFill>
@@ -20564,7 +20569,7 @@
               </a:ln>
               <a:extLst>
                 <a:ext uri="{91240B29-F687-4f45-9708-019B960494DF}">
-                  <a14:hiddenLine xmlns:a14="http://schemas.microsoft.com/office/drawing/2010/main" xmlns="" w="9525">
+                  <a14:hiddenLine xmlns="" xmlns:a14="http://schemas.microsoft.com/office/drawing/2010/main" w="9525">
                     <a:solidFill>
                       <a:srgbClr val="000000"/>
                     </a:solidFill>
@@ -20684,7 +20689,7 @@
               </a:ln>
               <a:extLst>
                 <a:ext uri="{91240B29-F687-4f45-9708-019B960494DF}">
-                  <a14:hiddenLine xmlns:a14="http://schemas.microsoft.com/office/drawing/2010/main" xmlns="" w="9525">
+                  <a14:hiddenLine xmlns="" xmlns:a14="http://schemas.microsoft.com/office/drawing/2010/main" w="9525">
                     <a:solidFill>
                       <a:srgbClr val="000000"/>
                     </a:solidFill>
@@ -20782,7 +20787,7 @@
               </a:ln>
               <a:extLst>
                 <a:ext uri="{91240B29-F687-4f45-9708-019B960494DF}">
-                  <a14:hiddenLine xmlns:a14="http://schemas.microsoft.com/office/drawing/2010/main" xmlns="" w="9525">
+                  <a14:hiddenLine xmlns="" xmlns:a14="http://schemas.microsoft.com/office/drawing/2010/main" w="9525">
                     <a:solidFill>
                       <a:srgbClr val="000000"/>
                     </a:solidFill>
@@ -20897,7 +20902,7 @@
               </a:ln>
               <a:extLst>
                 <a:ext uri="{91240B29-F687-4f45-9708-019B960494DF}">
-                  <a14:hiddenLine xmlns:a14="http://schemas.microsoft.com/office/drawing/2010/main" xmlns="" w="9525">
+                  <a14:hiddenLine xmlns="" xmlns:a14="http://schemas.microsoft.com/office/drawing/2010/main" w="9525">
                     <a:solidFill>
                       <a:srgbClr val="000000"/>
                     </a:solidFill>
@@ -20987,7 +20992,7 @@
               </a:ln>
               <a:extLst>
                 <a:ext uri="{91240B29-F687-4f45-9708-019B960494DF}">
-                  <a14:hiddenLine xmlns:a14="http://schemas.microsoft.com/office/drawing/2010/main" xmlns="" w="9525">
+                  <a14:hiddenLine xmlns="" xmlns:a14="http://schemas.microsoft.com/office/drawing/2010/main" w="9525">
                     <a:solidFill>
                       <a:srgbClr val="000000"/>
                     </a:solidFill>
@@ -21052,7 +21057,7 @@
               </a:ln>
               <a:extLst>
                 <a:ext uri="{91240B29-F687-4f45-9708-019B960494DF}">
-                  <a14:hiddenLine xmlns:a14="http://schemas.microsoft.com/office/drawing/2010/main" xmlns="" w="9525">
+                  <a14:hiddenLine xmlns="" xmlns:a14="http://schemas.microsoft.com/office/drawing/2010/main" w="9525">
                     <a:solidFill>
                       <a:srgbClr val="000000"/>
                     </a:solidFill>
@@ -21142,7 +21147,7 @@
               </a:ln>
               <a:extLst>
                 <a:ext uri="{91240B29-F687-4f45-9708-019B960494DF}">
-                  <a14:hiddenLine xmlns:a14="http://schemas.microsoft.com/office/drawing/2010/main" xmlns="" w="9525">
+                  <a14:hiddenLine xmlns="" xmlns:a14="http://schemas.microsoft.com/office/drawing/2010/main" w="9525">
                     <a:solidFill>
                       <a:srgbClr val="000000"/>
                     </a:solidFill>
@@ -21210,7 +21215,7 @@
               </a:ln>
               <a:extLst>
                 <a:ext uri="{91240B29-F687-4f45-9708-019B960494DF}">
-                  <a14:hiddenLine xmlns:a14="http://schemas.microsoft.com/office/drawing/2010/main" xmlns="" w="9525">
+                  <a14:hiddenLine xmlns="" xmlns:a14="http://schemas.microsoft.com/office/drawing/2010/main" w="9525">
                     <a:solidFill>
                       <a:srgbClr val="000000"/>
                     </a:solidFill>
@@ -21300,7 +21305,7 @@
               </a:ln>
               <a:extLst>
                 <a:ext uri="{91240B29-F687-4f45-9708-019B960494DF}">
-                  <a14:hiddenLine xmlns:a14="http://schemas.microsoft.com/office/drawing/2010/main" xmlns="" w="9525">
+                  <a14:hiddenLine xmlns="" xmlns:a14="http://schemas.microsoft.com/office/drawing/2010/main" w="9525">
                     <a:solidFill>
                       <a:srgbClr val="000000"/>
                     </a:solidFill>
@@ -21368,7 +21373,7 @@
               </a:ln>
               <a:extLst>
                 <a:ext uri="{91240B29-F687-4f45-9708-019B960494DF}">
-                  <a14:hiddenLine xmlns:a14="http://schemas.microsoft.com/office/drawing/2010/main" xmlns="" w="9525">
+                  <a14:hiddenLine xmlns="" xmlns:a14="http://schemas.microsoft.com/office/drawing/2010/main" w="9525">
                     <a:solidFill>
                       <a:srgbClr val="000000"/>
                     </a:solidFill>
@@ -21458,7 +21463,7 @@
               </a:ln>
               <a:extLst>
                 <a:ext uri="{91240B29-F687-4f45-9708-019B960494DF}">
-                  <a14:hiddenLine xmlns:a14="http://schemas.microsoft.com/office/drawing/2010/main" xmlns="" w="9525">
+                  <a14:hiddenLine xmlns="" xmlns:a14="http://schemas.microsoft.com/office/drawing/2010/main" w="9525">
                     <a:solidFill>
                       <a:srgbClr val="000000"/>
                     </a:solidFill>
@@ -21492,7 +21497,7 @@
               </a:ln>
               <a:extLst>
                 <a:ext uri="{91240B29-F687-4f45-9708-019B960494DF}">
-                  <a14:hiddenLine xmlns:a14="http://schemas.microsoft.com/office/drawing/2010/main" xmlns="" w="9525">
+                  <a14:hiddenLine xmlns="" xmlns:a14="http://schemas.microsoft.com/office/drawing/2010/main" w="9525">
                     <a:solidFill>
                       <a:srgbClr val="000000"/>
                     </a:solidFill>
@@ -23994,7 +23999,7 @@
           <a:noFill/>
           <a:extLst>
             <a:ext uri="{909E8E84-426E-40dd-AFC4-6F175D3DCCD1}">
-              <a14:hiddenFill xmlns="" xmlns:a16="http://schemas.microsoft.com/office/drawing/2014/main" xmlns:p14="http://schemas.microsoft.com/office/powerpoint/2010/main" xmlns:a14="http://schemas.microsoft.com/office/drawing/2010/main">
+              <a14:hiddenFill xmlns:a14="http://schemas.microsoft.com/office/drawing/2010/main" xmlns:p14="http://schemas.microsoft.com/office/powerpoint/2010/main" xmlns:a16="http://schemas.microsoft.com/office/drawing/2014/main" xmlns="">
                 <a:solidFill>
                   <a:srgbClr val="FFFFFF"/>
                 </a:solidFill>
@@ -24086,7 +24091,7 @@
             </a:ln>
             <a:extLst>
               <a:ext uri="{91240B29-F687-4f45-9708-019B960494DF}">
-                <a14:hiddenLine xmlns="" xmlns:a16="http://schemas.microsoft.com/office/drawing/2014/main" xmlns:p14="http://schemas.microsoft.com/office/powerpoint/2010/main" xmlns:a14="http://schemas.microsoft.com/office/drawing/2010/main" w="9525">
+                <a14:hiddenLine xmlns:a14="http://schemas.microsoft.com/office/drawing/2010/main" xmlns:p14="http://schemas.microsoft.com/office/powerpoint/2010/main" xmlns:a16="http://schemas.microsoft.com/office/drawing/2014/main" xmlns="" w="9525">
                   <a:solidFill>
                     <a:srgbClr val="000000"/>
                   </a:solidFill>
@@ -24191,7 +24196,7 @@
             </a:ln>
             <a:extLst>
               <a:ext uri="{91240B29-F687-4f45-9708-019B960494DF}">
-                <a14:hiddenLine xmlns="" xmlns:a16="http://schemas.microsoft.com/office/drawing/2014/main" xmlns:p14="http://schemas.microsoft.com/office/powerpoint/2010/main" xmlns:a14="http://schemas.microsoft.com/office/drawing/2010/main" w="9525">
+                <a14:hiddenLine xmlns:a14="http://schemas.microsoft.com/office/drawing/2010/main" xmlns:p14="http://schemas.microsoft.com/office/powerpoint/2010/main" xmlns:a16="http://schemas.microsoft.com/office/drawing/2014/main" xmlns="" w="9525">
                   <a:solidFill>
                     <a:srgbClr val="000000"/>
                   </a:solidFill>
@@ -24296,7 +24301,7 @@
             </a:ln>
             <a:extLst>
               <a:ext uri="{91240B29-F687-4f45-9708-019B960494DF}">
-                <a14:hiddenLine xmlns="" xmlns:a16="http://schemas.microsoft.com/office/drawing/2014/main" xmlns:p14="http://schemas.microsoft.com/office/powerpoint/2010/main" xmlns:a14="http://schemas.microsoft.com/office/drawing/2010/main" w="9525">
+                <a14:hiddenLine xmlns:a14="http://schemas.microsoft.com/office/drawing/2010/main" xmlns:p14="http://schemas.microsoft.com/office/powerpoint/2010/main" xmlns:a16="http://schemas.microsoft.com/office/drawing/2014/main" xmlns="" w="9525">
                   <a:solidFill>
                     <a:srgbClr val="000000"/>
                   </a:solidFill>
@@ -24345,7 +24350,7 @@
             </a:ln>
             <a:extLst>
               <a:ext uri="{91240B29-F687-4f45-9708-019B960494DF}">
-                <a14:hiddenLine xmlns="" xmlns:a16="http://schemas.microsoft.com/office/drawing/2014/main" xmlns:p14="http://schemas.microsoft.com/office/powerpoint/2010/main" xmlns:a14="http://schemas.microsoft.com/office/drawing/2010/main" w="9525">
+                <a14:hiddenLine xmlns:a14="http://schemas.microsoft.com/office/drawing/2010/main" xmlns:p14="http://schemas.microsoft.com/office/powerpoint/2010/main" xmlns:a16="http://schemas.microsoft.com/office/drawing/2014/main" xmlns="" w="9525">
                   <a:solidFill>
                     <a:srgbClr val="000000"/>
                   </a:solidFill>
@@ -24450,7 +24455,7 @@
             </a:ln>
             <a:extLst>
               <a:ext uri="{91240B29-F687-4f45-9708-019B960494DF}">
-                <a14:hiddenLine xmlns="" xmlns:a16="http://schemas.microsoft.com/office/drawing/2014/main" xmlns:p14="http://schemas.microsoft.com/office/powerpoint/2010/main" xmlns:a14="http://schemas.microsoft.com/office/drawing/2010/main" w="9525">
+                <a14:hiddenLine xmlns:a14="http://schemas.microsoft.com/office/drawing/2010/main" xmlns:p14="http://schemas.microsoft.com/office/powerpoint/2010/main" xmlns:a16="http://schemas.microsoft.com/office/drawing/2014/main" xmlns="" w="9525">
                   <a:solidFill>
                     <a:srgbClr val="000000"/>
                   </a:solidFill>
@@ -24527,7 +24532,7 @@
             </a:ln>
             <a:extLst>
               <a:ext uri="{91240B29-F687-4f45-9708-019B960494DF}">
-                <a14:hiddenLine xmlns="" xmlns:a16="http://schemas.microsoft.com/office/drawing/2014/main" xmlns:p14="http://schemas.microsoft.com/office/powerpoint/2010/main" xmlns:a14="http://schemas.microsoft.com/office/drawing/2010/main" w="9525">
+                <a14:hiddenLine xmlns:a14="http://schemas.microsoft.com/office/drawing/2010/main" xmlns:p14="http://schemas.microsoft.com/office/powerpoint/2010/main" xmlns:a16="http://schemas.microsoft.com/office/drawing/2014/main" xmlns="" w="9525">
                   <a:solidFill>
                     <a:srgbClr val="000000"/>
                   </a:solidFill>
@@ -24604,7 +24609,7 @@
             </a:ln>
             <a:extLst>
               <a:ext uri="{91240B29-F687-4f45-9708-019B960494DF}">
-                <a14:hiddenLine xmlns="" xmlns:a16="http://schemas.microsoft.com/office/drawing/2014/main" xmlns:p14="http://schemas.microsoft.com/office/powerpoint/2010/main" xmlns:a14="http://schemas.microsoft.com/office/drawing/2010/main" w="9525">
+                <a14:hiddenLine xmlns:a14="http://schemas.microsoft.com/office/drawing/2010/main" xmlns:p14="http://schemas.microsoft.com/office/powerpoint/2010/main" xmlns:a16="http://schemas.microsoft.com/office/drawing/2014/main" xmlns="" w="9525">
                   <a:solidFill>
                     <a:srgbClr val="000000"/>
                   </a:solidFill>
@@ -24709,7 +24714,7 @@
             </a:ln>
             <a:extLst>
               <a:ext uri="{91240B29-F687-4f45-9708-019B960494DF}">
-                <a14:hiddenLine xmlns="" xmlns:a16="http://schemas.microsoft.com/office/drawing/2014/main" xmlns:p14="http://schemas.microsoft.com/office/powerpoint/2010/main" xmlns:a14="http://schemas.microsoft.com/office/drawing/2010/main" w="9525">
+                <a14:hiddenLine xmlns:a14="http://schemas.microsoft.com/office/drawing/2010/main" xmlns:p14="http://schemas.microsoft.com/office/powerpoint/2010/main" xmlns:a16="http://schemas.microsoft.com/office/drawing/2014/main" xmlns="" w="9525">
                   <a:solidFill>
                     <a:srgbClr val="000000"/>
                   </a:solidFill>
@@ -24786,7 +24791,7 @@
             </a:ln>
             <a:extLst>
               <a:ext uri="{91240B29-F687-4f45-9708-019B960494DF}">
-                <a14:hiddenLine xmlns="" xmlns:a16="http://schemas.microsoft.com/office/drawing/2014/main" xmlns:p14="http://schemas.microsoft.com/office/powerpoint/2010/main" xmlns:a14="http://schemas.microsoft.com/office/drawing/2010/main" w="9525">
+                <a14:hiddenLine xmlns:a14="http://schemas.microsoft.com/office/drawing/2010/main" xmlns:p14="http://schemas.microsoft.com/office/powerpoint/2010/main" xmlns:a16="http://schemas.microsoft.com/office/drawing/2014/main" xmlns="" w="9525">
                   <a:solidFill>
                     <a:srgbClr val="000000"/>
                   </a:solidFill>
@@ -24863,7 +24868,7 @@
             </a:ln>
             <a:extLst>
               <a:ext uri="{91240B29-F687-4f45-9708-019B960494DF}">
-                <a14:hiddenLine xmlns="" xmlns:a16="http://schemas.microsoft.com/office/drawing/2014/main" xmlns:p14="http://schemas.microsoft.com/office/powerpoint/2010/main" xmlns:a14="http://schemas.microsoft.com/office/drawing/2010/main" w="9525">
+                <a14:hiddenLine xmlns:a14="http://schemas.microsoft.com/office/drawing/2010/main" xmlns:p14="http://schemas.microsoft.com/office/powerpoint/2010/main" xmlns:a16="http://schemas.microsoft.com/office/drawing/2014/main" xmlns="" w="9525">
                   <a:solidFill>
                     <a:srgbClr val="000000"/>
                   </a:solidFill>
@@ -24968,7 +24973,7 @@
             </a:ln>
             <a:extLst>
               <a:ext uri="{91240B29-F687-4f45-9708-019B960494DF}">
-                <a14:hiddenLine xmlns="" xmlns:a16="http://schemas.microsoft.com/office/drawing/2014/main" xmlns:p14="http://schemas.microsoft.com/office/powerpoint/2010/main" xmlns:a14="http://schemas.microsoft.com/office/drawing/2010/main" w="9525">
+                <a14:hiddenLine xmlns:a14="http://schemas.microsoft.com/office/drawing/2010/main" xmlns:p14="http://schemas.microsoft.com/office/powerpoint/2010/main" xmlns:a16="http://schemas.microsoft.com/office/drawing/2014/main" xmlns="" w="9525">
                   <a:solidFill>
                     <a:srgbClr val="000000"/>
                   </a:solidFill>
@@ -25073,7 +25078,7 @@
             </a:ln>
             <a:extLst>
               <a:ext uri="{91240B29-F687-4f45-9708-019B960494DF}">
-                <a14:hiddenLine xmlns="" xmlns:a16="http://schemas.microsoft.com/office/drawing/2014/main" xmlns:p14="http://schemas.microsoft.com/office/powerpoint/2010/main" xmlns:a14="http://schemas.microsoft.com/office/drawing/2010/main" w="9525">
+                <a14:hiddenLine xmlns:a14="http://schemas.microsoft.com/office/drawing/2010/main" xmlns:p14="http://schemas.microsoft.com/office/powerpoint/2010/main" xmlns:a16="http://schemas.microsoft.com/office/drawing/2014/main" xmlns="" w="9525">
                   <a:solidFill>
                     <a:srgbClr val="000000"/>
                   </a:solidFill>
@@ -25150,7 +25155,7 @@
             </a:ln>
             <a:extLst>
               <a:ext uri="{91240B29-F687-4f45-9708-019B960494DF}">
-                <a14:hiddenLine xmlns="" xmlns:a16="http://schemas.microsoft.com/office/drawing/2014/main" xmlns:p14="http://schemas.microsoft.com/office/powerpoint/2010/main" xmlns:a14="http://schemas.microsoft.com/office/drawing/2010/main" w="9525">
+                <a14:hiddenLine xmlns:a14="http://schemas.microsoft.com/office/drawing/2010/main" xmlns:p14="http://schemas.microsoft.com/office/powerpoint/2010/main" xmlns:a16="http://schemas.microsoft.com/office/drawing/2014/main" xmlns="" w="9525">
                   <a:solidFill>
                     <a:srgbClr val="000000"/>
                   </a:solidFill>
@@ -25275,7 +25280,7 @@
             </a:ln>
             <a:extLst>
               <a:ext uri="{91240B29-F687-4f45-9708-019B960494DF}">
-                <a14:hiddenLine xmlns="" xmlns:a16="http://schemas.microsoft.com/office/drawing/2014/main" xmlns:p14="http://schemas.microsoft.com/office/powerpoint/2010/main" xmlns:a14="http://schemas.microsoft.com/office/drawing/2010/main" w="9525">
+                <a14:hiddenLine xmlns:a14="http://schemas.microsoft.com/office/drawing/2010/main" xmlns:p14="http://schemas.microsoft.com/office/powerpoint/2010/main" xmlns:a16="http://schemas.microsoft.com/office/drawing/2014/main" xmlns="" w="9525">
                   <a:solidFill>
                     <a:srgbClr val="000000"/>
                   </a:solidFill>
@@ -25352,7 +25357,7 @@
             </a:ln>
             <a:extLst>
               <a:ext uri="{91240B29-F687-4f45-9708-019B960494DF}">
-                <a14:hiddenLine xmlns="" xmlns:a16="http://schemas.microsoft.com/office/drawing/2014/main" xmlns:p14="http://schemas.microsoft.com/office/powerpoint/2010/main" xmlns:a14="http://schemas.microsoft.com/office/drawing/2010/main" w="9525">
+                <a14:hiddenLine xmlns:a14="http://schemas.microsoft.com/office/drawing/2010/main" xmlns:p14="http://schemas.microsoft.com/office/powerpoint/2010/main" xmlns:a16="http://schemas.microsoft.com/office/drawing/2014/main" xmlns="" w="9525">
                   <a:solidFill>
                     <a:srgbClr val="000000"/>
                   </a:solidFill>
@@ -25457,7 +25462,7 @@
             </a:ln>
             <a:extLst>
               <a:ext uri="{91240B29-F687-4f45-9708-019B960494DF}">
-                <a14:hiddenLine xmlns="" xmlns:a16="http://schemas.microsoft.com/office/drawing/2014/main" xmlns:p14="http://schemas.microsoft.com/office/powerpoint/2010/main" xmlns:a14="http://schemas.microsoft.com/office/drawing/2010/main" w="9525">
+                <a14:hiddenLine xmlns:a14="http://schemas.microsoft.com/office/drawing/2010/main" xmlns:p14="http://schemas.microsoft.com/office/powerpoint/2010/main" xmlns:a16="http://schemas.microsoft.com/office/drawing/2014/main" xmlns="" w="9525">
                   <a:solidFill>
                     <a:srgbClr val="000000"/>
                   </a:solidFill>
@@ -25562,7 +25567,7 @@
             </a:ln>
             <a:extLst>
               <a:ext uri="{91240B29-F687-4f45-9708-019B960494DF}">
-                <a14:hiddenLine xmlns="" xmlns:a16="http://schemas.microsoft.com/office/drawing/2014/main" xmlns:p14="http://schemas.microsoft.com/office/powerpoint/2010/main" xmlns:a14="http://schemas.microsoft.com/office/drawing/2010/main" w="9525">
+                <a14:hiddenLine xmlns:a14="http://schemas.microsoft.com/office/drawing/2010/main" xmlns:p14="http://schemas.microsoft.com/office/powerpoint/2010/main" xmlns:a16="http://schemas.microsoft.com/office/drawing/2014/main" xmlns="" w="9525">
                   <a:solidFill>
                     <a:srgbClr val="000000"/>
                   </a:solidFill>
@@ -25639,7 +25644,7 @@
             </a:ln>
             <a:extLst>
               <a:ext uri="{91240B29-F687-4f45-9708-019B960494DF}">
-                <a14:hiddenLine xmlns="" xmlns:a16="http://schemas.microsoft.com/office/drawing/2014/main" xmlns:p14="http://schemas.microsoft.com/office/powerpoint/2010/main" xmlns:a14="http://schemas.microsoft.com/office/drawing/2010/main" w="9525">
+                <a14:hiddenLine xmlns:a14="http://schemas.microsoft.com/office/drawing/2010/main" xmlns:p14="http://schemas.microsoft.com/office/powerpoint/2010/main" xmlns:a16="http://schemas.microsoft.com/office/drawing/2014/main" xmlns="" w="9525">
                   <a:solidFill>
                     <a:srgbClr val="000000"/>
                   </a:solidFill>
@@ -25744,7 +25749,7 @@
             </a:ln>
             <a:extLst>
               <a:ext uri="{91240B29-F687-4f45-9708-019B960494DF}">
-                <a14:hiddenLine xmlns="" xmlns:a16="http://schemas.microsoft.com/office/drawing/2014/main" xmlns:p14="http://schemas.microsoft.com/office/powerpoint/2010/main" xmlns:a14="http://schemas.microsoft.com/office/drawing/2010/main" w="9525">
+                <a14:hiddenLine xmlns:a14="http://schemas.microsoft.com/office/drawing/2010/main" xmlns:p14="http://schemas.microsoft.com/office/powerpoint/2010/main" xmlns:a16="http://schemas.microsoft.com/office/drawing/2014/main" xmlns="" w="9525">
                   <a:solidFill>
                     <a:srgbClr val="000000"/>
                   </a:solidFill>
@@ -25849,7 +25854,7 @@
             </a:ln>
             <a:extLst>
               <a:ext uri="{91240B29-F687-4f45-9708-019B960494DF}">
-                <a14:hiddenLine xmlns="" xmlns:a16="http://schemas.microsoft.com/office/drawing/2014/main" xmlns:p14="http://schemas.microsoft.com/office/powerpoint/2010/main" xmlns:a14="http://schemas.microsoft.com/office/drawing/2010/main" w="9525">
+                <a14:hiddenLine xmlns:a14="http://schemas.microsoft.com/office/drawing/2010/main" xmlns:p14="http://schemas.microsoft.com/office/powerpoint/2010/main" xmlns:a16="http://schemas.microsoft.com/office/drawing/2014/main" xmlns="" w="9525">
                   <a:solidFill>
                     <a:srgbClr val="000000"/>
                   </a:solidFill>
@@ -25920,7 +25925,7 @@
             </a:ln>
             <a:extLst>
               <a:ext uri="{91240B29-F687-4f45-9708-019B960494DF}">
-                <a14:hiddenLine xmlns="" xmlns:a16="http://schemas.microsoft.com/office/drawing/2014/main" xmlns:p14="http://schemas.microsoft.com/office/powerpoint/2010/main" xmlns:a14="http://schemas.microsoft.com/office/drawing/2010/main" w="9525">
+                <a14:hiddenLine xmlns:a14="http://schemas.microsoft.com/office/drawing/2010/main" xmlns:p14="http://schemas.microsoft.com/office/powerpoint/2010/main" xmlns:a16="http://schemas.microsoft.com/office/drawing/2014/main" xmlns="" w="9525">
                   <a:solidFill>
                     <a:srgbClr val="000000"/>
                   </a:solidFill>
@@ -26025,7 +26030,7 @@
             </a:ln>
             <a:extLst>
               <a:ext uri="{91240B29-F687-4f45-9708-019B960494DF}">
-                <a14:hiddenLine xmlns="" xmlns:a16="http://schemas.microsoft.com/office/drawing/2014/main" xmlns:p14="http://schemas.microsoft.com/office/powerpoint/2010/main" xmlns:a14="http://schemas.microsoft.com/office/drawing/2010/main" w="9525">
+                <a14:hiddenLine xmlns:a14="http://schemas.microsoft.com/office/drawing/2010/main" xmlns:p14="http://schemas.microsoft.com/office/powerpoint/2010/main" xmlns:a16="http://schemas.microsoft.com/office/drawing/2014/main" xmlns="" w="9525">
                   <a:solidFill>
                     <a:srgbClr val="000000"/>
                   </a:solidFill>
@@ -26096,7 +26101,7 @@
             </a:ln>
             <a:extLst>
               <a:ext uri="{91240B29-F687-4f45-9708-019B960494DF}">
-                <a14:hiddenLine xmlns="" xmlns:a16="http://schemas.microsoft.com/office/drawing/2014/main" xmlns:p14="http://schemas.microsoft.com/office/powerpoint/2010/main" xmlns:a14="http://schemas.microsoft.com/office/drawing/2010/main" w="9525">
+                <a14:hiddenLine xmlns:a14="http://schemas.microsoft.com/office/drawing/2010/main" xmlns:p14="http://schemas.microsoft.com/office/powerpoint/2010/main" xmlns:a16="http://schemas.microsoft.com/office/drawing/2014/main" xmlns="" w="9525">
                   <a:solidFill>
                     <a:srgbClr val="000000"/>
                   </a:solidFill>
@@ -26201,7 +26206,7 @@
             </a:ln>
             <a:extLst>
               <a:ext uri="{91240B29-F687-4f45-9708-019B960494DF}">
-                <a14:hiddenLine xmlns="" xmlns:a16="http://schemas.microsoft.com/office/drawing/2014/main" xmlns:p14="http://schemas.microsoft.com/office/powerpoint/2010/main" xmlns:a14="http://schemas.microsoft.com/office/drawing/2010/main" w="9525">
+                <a14:hiddenLine xmlns:a14="http://schemas.microsoft.com/office/drawing/2010/main" xmlns:p14="http://schemas.microsoft.com/office/powerpoint/2010/main" xmlns:a16="http://schemas.microsoft.com/office/drawing/2014/main" xmlns="" w="9525">
                   <a:solidFill>
                     <a:srgbClr val="000000"/>
                   </a:solidFill>
@@ -26284,7 +26289,7 @@
             </a:ln>
             <a:extLst>
               <a:ext uri="{91240B29-F687-4f45-9708-019B960494DF}">
-                <a14:hiddenLine xmlns="" xmlns:a16="http://schemas.microsoft.com/office/drawing/2014/main" xmlns:p14="http://schemas.microsoft.com/office/powerpoint/2010/main" xmlns:a14="http://schemas.microsoft.com/office/drawing/2010/main" w="9525">
+                <a14:hiddenLine xmlns:a14="http://schemas.microsoft.com/office/drawing/2010/main" xmlns:p14="http://schemas.microsoft.com/office/powerpoint/2010/main" xmlns:a16="http://schemas.microsoft.com/office/drawing/2014/main" xmlns="" w="9525">
                   <a:solidFill>
                     <a:srgbClr val="000000"/>
                   </a:solidFill>
@@ -26389,7 +26394,7 @@
             </a:ln>
             <a:extLst>
               <a:ext uri="{91240B29-F687-4f45-9708-019B960494DF}">
-                <a14:hiddenLine xmlns="" xmlns:a16="http://schemas.microsoft.com/office/drawing/2014/main" xmlns:p14="http://schemas.microsoft.com/office/powerpoint/2010/main" xmlns:a14="http://schemas.microsoft.com/office/drawing/2010/main" w="9525">
+                <a14:hiddenLine xmlns:a14="http://schemas.microsoft.com/office/drawing/2010/main" xmlns:p14="http://schemas.microsoft.com/office/powerpoint/2010/main" xmlns:a16="http://schemas.microsoft.com/office/drawing/2014/main" xmlns="" w="9525">
                   <a:solidFill>
                     <a:srgbClr val="000000"/>
                   </a:solidFill>
@@ -26472,7 +26477,7 @@
             </a:ln>
             <a:extLst>
               <a:ext uri="{91240B29-F687-4f45-9708-019B960494DF}">
-                <a14:hiddenLine xmlns="" xmlns:a16="http://schemas.microsoft.com/office/drawing/2014/main" xmlns:p14="http://schemas.microsoft.com/office/powerpoint/2010/main" xmlns:a14="http://schemas.microsoft.com/office/drawing/2010/main" w="9525">
+                <a14:hiddenLine xmlns:a14="http://schemas.microsoft.com/office/drawing/2010/main" xmlns:p14="http://schemas.microsoft.com/office/powerpoint/2010/main" xmlns:a16="http://schemas.microsoft.com/office/drawing/2014/main" xmlns="" w="9525">
                   <a:solidFill>
                     <a:srgbClr val="000000"/>
                   </a:solidFill>
@@ -26577,7 +26582,7 @@
             </a:ln>
             <a:extLst>
               <a:ext uri="{91240B29-F687-4f45-9708-019B960494DF}">
-                <a14:hiddenLine xmlns="" xmlns:a16="http://schemas.microsoft.com/office/drawing/2014/main" xmlns:p14="http://schemas.microsoft.com/office/powerpoint/2010/main" xmlns:a14="http://schemas.microsoft.com/office/drawing/2010/main" w="9525">
+                <a14:hiddenLine xmlns:a14="http://schemas.microsoft.com/office/drawing/2010/main" xmlns:p14="http://schemas.microsoft.com/office/powerpoint/2010/main" xmlns:a16="http://schemas.microsoft.com/office/drawing/2014/main" xmlns="" w="9525">
                   <a:solidFill>
                     <a:srgbClr val="000000"/>
                   </a:solidFill>
@@ -26626,7 +26631,7 @@
             </a:ln>
             <a:extLst>
               <a:ext uri="{91240B29-F687-4f45-9708-019B960494DF}">
-                <a14:hiddenLine xmlns="" xmlns:a16="http://schemas.microsoft.com/office/drawing/2014/main" xmlns:p14="http://schemas.microsoft.com/office/powerpoint/2010/main" xmlns:a14="http://schemas.microsoft.com/office/drawing/2010/main" w="9525">
+                <a14:hiddenLine xmlns:a14="http://schemas.microsoft.com/office/drawing/2010/main" xmlns:p14="http://schemas.microsoft.com/office/powerpoint/2010/main" xmlns:a16="http://schemas.microsoft.com/office/drawing/2014/main" xmlns="" w="9525">
                   <a:solidFill>
                     <a:srgbClr val="000000"/>
                   </a:solidFill>
@@ -26731,7 +26736,7 @@
             </a:ln>
             <a:extLst>
               <a:ext uri="{91240B29-F687-4f45-9708-019B960494DF}">
-                <a14:hiddenLine xmlns="" xmlns:a16="http://schemas.microsoft.com/office/drawing/2014/main" xmlns:p14="http://schemas.microsoft.com/office/powerpoint/2010/main" xmlns:a14="http://schemas.microsoft.com/office/drawing/2010/main" w="9525">
+                <a14:hiddenLine xmlns:a14="http://schemas.microsoft.com/office/drawing/2010/main" xmlns:p14="http://schemas.microsoft.com/office/powerpoint/2010/main" xmlns:a16="http://schemas.microsoft.com/office/drawing/2014/main" xmlns="" w="9525">
                   <a:solidFill>
                     <a:srgbClr val="000000"/>
                   </a:solidFill>
@@ -26808,7 +26813,7 @@
             </a:ln>
             <a:extLst>
               <a:ext uri="{91240B29-F687-4f45-9708-019B960494DF}">
-                <a14:hiddenLine xmlns="" xmlns:a16="http://schemas.microsoft.com/office/drawing/2014/main" xmlns:p14="http://schemas.microsoft.com/office/powerpoint/2010/main" xmlns:a14="http://schemas.microsoft.com/office/drawing/2010/main" w="9525">
+                <a14:hiddenLine xmlns:a14="http://schemas.microsoft.com/office/drawing/2010/main" xmlns:p14="http://schemas.microsoft.com/office/powerpoint/2010/main" xmlns:a16="http://schemas.microsoft.com/office/drawing/2014/main" xmlns="" w="9525">
                   <a:solidFill>
                     <a:srgbClr val="000000"/>
                   </a:solidFill>
@@ -26885,7 +26890,7 @@
             </a:ln>
             <a:extLst>
               <a:ext uri="{91240B29-F687-4f45-9708-019B960494DF}">
-                <a14:hiddenLine xmlns="" xmlns:a16="http://schemas.microsoft.com/office/drawing/2014/main" xmlns:p14="http://schemas.microsoft.com/office/powerpoint/2010/main" xmlns:a14="http://schemas.microsoft.com/office/drawing/2010/main" w="9525">
+                <a14:hiddenLine xmlns:a14="http://schemas.microsoft.com/office/drawing/2010/main" xmlns:p14="http://schemas.microsoft.com/office/powerpoint/2010/main" xmlns:a16="http://schemas.microsoft.com/office/drawing/2014/main" xmlns="" w="9525">
                   <a:solidFill>
                     <a:srgbClr val="000000"/>
                   </a:solidFill>
@@ -26990,7 +26995,7 @@
             </a:ln>
             <a:extLst>
               <a:ext uri="{91240B29-F687-4f45-9708-019B960494DF}">
-                <a14:hiddenLine xmlns="" xmlns:a16="http://schemas.microsoft.com/office/drawing/2014/main" xmlns:p14="http://schemas.microsoft.com/office/powerpoint/2010/main" xmlns:a14="http://schemas.microsoft.com/office/drawing/2010/main" w="9525">
+                <a14:hiddenLine xmlns:a14="http://schemas.microsoft.com/office/drawing/2010/main" xmlns:p14="http://schemas.microsoft.com/office/powerpoint/2010/main" xmlns:a16="http://schemas.microsoft.com/office/drawing/2014/main" xmlns="" w="9525">
                   <a:solidFill>
                     <a:srgbClr val="000000"/>
                   </a:solidFill>
@@ -27073,7 +27078,7 @@
             </a:ln>
             <a:extLst>
               <a:ext uri="{91240B29-F687-4f45-9708-019B960494DF}">
-                <a14:hiddenLine xmlns="" xmlns:a16="http://schemas.microsoft.com/office/drawing/2014/main" xmlns:p14="http://schemas.microsoft.com/office/powerpoint/2010/main" xmlns:a14="http://schemas.microsoft.com/office/drawing/2010/main" w="9525">
+                <a14:hiddenLine xmlns:a14="http://schemas.microsoft.com/office/drawing/2010/main" xmlns:p14="http://schemas.microsoft.com/office/powerpoint/2010/main" xmlns:a16="http://schemas.microsoft.com/office/drawing/2014/main" xmlns="" w="9525">
                   <a:solidFill>
                     <a:srgbClr val="000000"/>
                   </a:solidFill>
@@ -27150,7 +27155,7 @@
             </a:ln>
             <a:extLst>
               <a:ext uri="{91240B29-F687-4f45-9708-019B960494DF}">
-                <a14:hiddenLine xmlns="" xmlns:a16="http://schemas.microsoft.com/office/drawing/2014/main" xmlns:p14="http://schemas.microsoft.com/office/powerpoint/2010/main" xmlns:a14="http://schemas.microsoft.com/office/drawing/2010/main" w="9525">
+                <a14:hiddenLine xmlns:a14="http://schemas.microsoft.com/office/drawing/2010/main" xmlns:p14="http://schemas.microsoft.com/office/powerpoint/2010/main" xmlns:a16="http://schemas.microsoft.com/office/drawing/2014/main" xmlns="" w="9525">
                   <a:solidFill>
                     <a:srgbClr val="000000"/>
                   </a:solidFill>
@@ -27255,7 +27260,7 @@
             </a:ln>
             <a:extLst>
               <a:ext uri="{91240B29-F687-4f45-9708-019B960494DF}">
-                <a14:hiddenLine xmlns="" xmlns:a16="http://schemas.microsoft.com/office/drawing/2014/main" xmlns:p14="http://schemas.microsoft.com/office/powerpoint/2010/main" xmlns:a14="http://schemas.microsoft.com/office/drawing/2010/main" w="9525">
+                <a14:hiddenLine xmlns:a14="http://schemas.microsoft.com/office/drawing/2010/main" xmlns:p14="http://schemas.microsoft.com/office/powerpoint/2010/main" xmlns:a16="http://schemas.microsoft.com/office/drawing/2014/main" xmlns="" w="9525">
                   <a:solidFill>
                     <a:srgbClr val="000000"/>
                   </a:solidFill>
@@ -27332,7 +27337,7 @@
             </a:ln>
             <a:extLst>
               <a:ext uri="{91240B29-F687-4f45-9708-019B960494DF}">
-                <a14:hiddenLine xmlns="" xmlns:a16="http://schemas.microsoft.com/office/drawing/2014/main" xmlns:p14="http://schemas.microsoft.com/office/powerpoint/2010/main" xmlns:a14="http://schemas.microsoft.com/office/drawing/2010/main" w="9525">
+                <a14:hiddenLine xmlns:a14="http://schemas.microsoft.com/office/drawing/2010/main" xmlns:p14="http://schemas.microsoft.com/office/powerpoint/2010/main" xmlns:a16="http://schemas.microsoft.com/office/drawing/2014/main" xmlns="" w="9525">
                   <a:solidFill>
                     <a:srgbClr val="000000"/>
                   </a:solidFill>
@@ -27437,7 +27442,7 @@
             </a:ln>
             <a:extLst>
               <a:ext uri="{91240B29-F687-4f45-9708-019B960494DF}">
-                <a14:hiddenLine xmlns="" xmlns:a16="http://schemas.microsoft.com/office/drawing/2014/main" xmlns:p14="http://schemas.microsoft.com/office/powerpoint/2010/main" xmlns:a14="http://schemas.microsoft.com/office/drawing/2010/main" w="9525">
+                <a14:hiddenLine xmlns:a14="http://schemas.microsoft.com/office/drawing/2010/main" xmlns:p14="http://schemas.microsoft.com/office/powerpoint/2010/main" xmlns:a16="http://schemas.microsoft.com/office/drawing/2014/main" xmlns="" w="9525">
                   <a:solidFill>
                     <a:srgbClr val="000000"/>
                   </a:solidFill>
@@ -27514,7 +27519,7 @@
             </a:ln>
             <a:extLst>
               <a:ext uri="{91240B29-F687-4f45-9708-019B960494DF}">
-                <a14:hiddenLine xmlns="" xmlns:a16="http://schemas.microsoft.com/office/drawing/2014/main" xmlns:p14="http://schemas.microsoft.com/office/powerpoint/2010/main" xmlns:a14="http://schemas.microsoft.com/office/drawing/2010/main" w="9525">
+                <a14:hiddenLine xmlns:a14="http://schemas.microsoft.com/office/drawing/2010/main" xmlns:p14="http://schemas.microsoft.com/office/powerpoint/2010/main" xmlns:a16="http://schemas.microsoft.com/office/drawing/2014/main" xmlns="" w="9525">
                   <a:solidFill>
                     <a:srgbClr val="000000"/>
                   </a:solidFill>
@@ -27619,7 +27624,7 @@
             </a:ln>
             <a:extLst>
               <a:ext uri="{91240B29-F687-4f45-9708-019B960494DF}">
-                <a14:hiddenLine xmlns="" xmlns:a16="http://schemas.microsoft.com/office/drawing/2014/main" xmlns:p14="http://schemas.microsoft.com/office/powerpoint/2010/main" xmlns:a14="http://schemas.microsoft.com/office/drawing/2010/main" w="9525">
+                <a14:hiddenLine xmlns:a14="http://schemas.microsoft.com/office/drawing/2010/main" xmlns:p14="http://schemas.microsoft.com/office/powerpoint/2010/main" xmlns:a16="http://schemas.microsoft.com/office/drawing/2014/main" xmlns="" w="9525">
                   <a:solidFill>
                     <a:srgbClr val="000000"/>
                   </a:solidFill>
@@ -27668,7 +27673,7 @@
             </a:ln>
             <a:extLst>
               <a:ext uri="{91240B29-F687-4f45-9708-019B960494DF}">
-                <a14:hiddenLine xmlns="" xmlns:a16="http://schemas.microsoft.com/office/drawing/2014/main" xmlns:p14="http://schemas.microsoft.com/office/powerpoint/2010/main" xmlns:a14="http://schemas.microsoft.com/office/drawing/2010/main" w="9525">
+                <a14:hiddenLine xmlns:a14="http://schemas.microsoft.com/office/drawing/2010/main" xmlns:p14="http://schemas.microsoft.com/office/powerpoint/2010/main" xmlns:a16="http://schemas.microsoft.com/office/drawing/2014/main" xmlns="" w="9525">
                   <a:solidFill>
                     <a:srgbClr val="000000"/>
                   </a:solidFill>
@@ -27748,7 +27753,7 @@
             </a:ln>
             <a:extLst>
               <a:ext uri="{91240B29-F687-4f45-9708-019B960494DF}">
-                <a14:hiddenLine xmlns="" xmlns:a16="http://schemas.microsoft.com/office/drawing/2014/main" xmlns:p14="http://schemas.microsoft.com/office/powerpoint/2010/main" xmlns:a14="http://schemas.microsoft.com/office/drawing/2010/main" w="9525">
+                <a14:hiddenLine xmlns:a14="http://schemas.microsoft.com/office/drawing/2010/main" xmlns:p14="http://schemas.microsoft.com/office/powerpoint/2010/main" xmlns:a16="http://schemas.microsoft.com/office/drawing/2014/main" xmlns="" w="9525">
                   <a:solidFill>
                     <a:srgbClr val="000000"/>
                   </a:solidFill>
@@ -27853,7 +27858,7 @@
             </a:ln>
             <a:extLst>
               <a:ext uri="{91240B29-F687-4f45-9708-019B960494DF}">
-                <a14:hiddenLine xmlns="" xmlns:a16="http://schemas.microsoft.com/office/drawing/2014/main" xmlns:p14="http://schemas.microsoft.com/office/powerpoint/2010/main" xmlns:a14="http://schemas.microsoft.com/office/drawing/2010/main" w="9525">
+                <a14:hiddenLine xmlns:a14="http://schemas.microsoft.com/office/drawing/2010/main" xmlns:p14="http://schemas.microsoft.com/office/powerpoint/2010/main" xmlns:a16="http://schemas.microsoft.com/office/drawing/2014/main" xmlns="" w="9525">
                   <a:solidFill>
                     <a:srgbClr val="000000"/>
                   </a:solidFill>
@@ -27930,7 +27935,7 @@
             </a:ln>
             <a:extLst>
               <a:ext uri="{91240B29-F687-4f45-9708-019B960494DF}">
-                <a14:hiddenLine xmlns="" xmlns:a16="http://schemas.microsoft.com/office/drawing/2014/main" xmlns:p14="http://schemas.microsoft.com/office/powerpoint/2010/main" xmlns:a14="http://schemas.microsoft.com/office/drawing/2010/main" w="9525">
+                <a14:hiddenLine xmlns:a14="http://schemas.microsoft.com/office/drawing/2010/main" xmlns:p14="http://schemas.microsoft.com/office/powerpoint/2010/main" xmlns:a16="http://schemas.microsoft.com/office/drawing/2014/main" xmlns="" w="9525">
                   <a:solidFill>
                     <a:srgbClr val="000000"/>
                   </a:solidFill>
@@ -28035,7 +28040,7 @@
             </a:ln>
             <a:extLst>
               <a:ext uri="{91240B29-F687-4f45-9708-019B960494DF}">
-                <a14:hiddenLine xmlns="" xmlns:a16="http://schemas.microsoft.com/office/drawing/2014/main" xmlns:p14="http://schemas.microsoft.com/office/powerpoint/2010/main" xmlns:a14="http://schemas.microsoft.com/office/drawing/2010/main" w="9525">
+                <a14:hiddenLine xmlns:a14="http://schemas.microsoft.com/office/drawing/2010/main" xmlns:p14="http://schemas.microsoft.com/office/powerpoint/2010/main" xmlns:a16="http://schemas.microsoft.com/office/drawing/2014/main" xmlns="" w="9525">
                   <a:solidFill>
                     <a:srgbClr val="000000"/>
                   </a:solidFill>
@@ -28140,7 +28145,7 @@
             </a:ln>
             <a:extLst>
               <a:ext uri="{91240B29-F687-4f45-9708-019B960494DF}">
-                <a14:hiddenLine xmlns="" xmlns:a16="http://schemas.microsoft.com/office/drawing/2014/main" xmlns:p14="http://schemas.microsoft.com/office/powerpoint/2010/main" xmlns:a14="http://schemas.microsoft.com/office/drawing/2010/main" w="9525">
+                <a14:hiddenLine xmlns:a14="http://schemas.microsoft.com/office/drawing/2010/main" xmlns:p14="http://schemas.microsoft.com/office/powerpoint/2010/main" xmlns:a16="http://schemas.microsoft.com/office/drawing/2014/main" xmlns="" w="9525">
                   <a:solidFill>
                     <a:srgbClr val="000000"/>
                   </a:solidFill>
@@ -28220,7 +28225,7 @@
             </a:ln>
             <a:extLst>
               <a:ext uri="{91240B29-F687-4f45-9708-019B960494DF}">
-                <a14:hiddenLine xmlns="" xmlns:a16="http://schemas.microsoft.com/office/drawing/2014/main" xmlns:p14="http://schemas.microsoft.com/office/powerpoint/2010/main" xmlns:a14="http://schemas.microsoft.com/office/drawing/2010/main" w="9525">
+                <a14:hiddenLine xmlns:a14="http://schemas.microsoft.com/office/drawing/2010/main" xmlns:p14="http://schemas.microsoft.com/office/powerpoint/2010/main" xmlns:a16="http://schemas.microsoft.com/office/drawing/2014/main" xmlns="" w="9525">
                   <a:solidFill>
                     <a:srgbClr val="000000"/>
                   </a:solidFill>
@@ -28297,7 +28302,7 @@
             </a:ln>
             <a:extLst>
               <a:ext uri="{91240B29-F687-4f45-9708-019B960494DF}">
-                <a14:hiddenLine xmlns="" xmlns:a16="http://schemas.microsoft.com/office/drawing/2014/main" xmlns:p14="http://schemas.microsoft.com/office/powerpoint/2010/main" xmlns:a14="http://schemas.microsoft.com/office/drawing/2010/main" w="9525">
+                <a14:hiddenLine xmlns:a14="http://schemas.microsoft.com/office/drawing/2010/main" xmlns:p14="http://schemas.microsoft.com/office/powerpoint/2010/main" xmlns:a16="http://schemas.microsoft.com/office/drawing/2014/main" xmlns="" w="9525">
                   <a:solidFill>
                     <a:srgbClr val="000000"/>
                   </a:solidFill>
@@ -28402,7 +28407,7 @@
             </a:ln>
             <a:extLst>
               <a:ext uri="{91240B29-F687-4f45-9708-019B960494DF}">
-                <a14:hiddenLine xmlns="" xmlns:a16="http://schemas.microsoft.com/office/drawing/2014/main" xmlns:p14="http://schemas.microsoft.com/office/powerpoint/2010/main" xmlns:a14="http://schemas.microsoft.com/office/drawing/2010/main" w="9525">
+                <a14:hiddenLine xmlns:a14="http://schemas.microsoft.com/office/drawing/2010/main" xmlns:p14="http://schemas.microsoft.com/office/powerpoint/2010/main" xmlns:a16="http://schemas.microsoft.com/office/drawing/2014/main" xmlns="" w="9525">
                   <a:solidFill>
                     <a:srgbClr val="000000"/>
                   </a:solidFill>
@@ -28507,7 +28512,7 @@
             </a:ln>
             <a:extLst>
               <a:ext uri="{91240B29-F687-4f45-9708-019B960494DF}">
-                <a14:hiddenLine xmlns="" xmlns:a16="http://schemas.microsoft.com/office/drawing/2014/main" xmlns:p14="http://schemas.microsoft.com/office/powerpoint/2010/main" xmlns:a14="http://schemas.microsoft.com/office/drawing/2010/main" w="9525">
+                <a14:hiddenLine xmlns:a14="http://schemas.microsoft.com/office/drawing/2010/main" xmlns:p14="http://schemas.microsoft.com/office/powerpoint/2010/main" xmlns:a16="http://schemas.microsoft.com/office/drawing/2014/main" xmlns="" w="9525">
                   <a:solidFill>
                     <a:srgbClr val="000000"/>
                   </a:solidFill>
@@ -28584,7 +28589,7 @@
             </a:ln>
             <a:extLst>
               <a:ext uri="{91240B29-F687-4f45-9708-019B960494DF}">
-                <a14:hiddenLine xmlns="" xmlns:a16="http://schemas.microsoft.com/office/drawing/2014/main" xmlns:p14="http://schemas.microsoft.com/office/powerpoint/2010/main" xmlns:a14="http://schemas.microsoft.com/office/drawing/2010/main" w="9525">
+                <a14:hiddenLine xmlns:a14="http://schemas.microsoft.com/office/drawing/2010/main" xmlns:p14="http://schemas.microsoft.com/office/powerpoint/2010/main" xmlns:a16="http://schemas.microsoft.com/office/drawing/2014/main" xmlns="" w="9525">
                   <a:solidFill>
                     <a:srgbClr val="000000"/>
                   </a:solidFill>
@@ -28719,7 +28724,7 @@
             </a:ln>
             <a:extLst>
               <a:ext uri="{91240B29-F687-4f45-9708-019B960494DF}">
-                <a14:hiddenLine xmlns="" xmlns:a16="http://schemas.microsoft.com/office/drawing/2014/main" xmlns:p14="http://schemas.microsoft.com/office/powerpoint/2010/main" xmlns:a14="http://schemas.microsoft.com/office/drawing/2010/main" w="9525">
+                <a14:hiddenLine xmlns:a14="http://schemas.microsoft.com/office/drawing/2010/main" xmlns:p14="http://schemas.microsoft.com/office/powerpoint/2010/main" xmlns:a16="http://schemas.microsoft.com/office/drawing/2014/main" xmlns="" w="9525">
                   <a:solidFill>
                     <a:srgbClr val="000000"/>
                   </a:solidFill>
@@ -28802,7 +28807,7 @@
             </a:ln>
             <a:extLst>
               <a:ext uri="{91240B29-F687-4f45-9708-019B960494DF}">
-                <a14:hiddenLine xmlns="" xmlns:a16="http://schemas.microsoft.com/office/drawing/2014/main" xmlns:p14="http://schemas.microsoft.com/office/powerpoint/2010/main" xmlns:a14="http://schemas.microsoft.com/office/drawing/2010/main" w="9525">
+                <a14:hiddenLine xmlns:a14="http://schemas.microsoft.com/office/drawing/2010/main" xmlns:p14="http://schemas.microsoft.com/office/powerpoint/2010/main" xmlns:a16="http://schemas.microsoft.com/office/drawing/2014/main" xmlns="" w="9525">
                   <a:solidFill>
                     <a:srgbClr val="000000"/>
                   </a:solidFill>
@@ -28907,7 +28912,7 @@
             </a:ln>
             <a:extLst>
               <a:ext uri="{91240B29-F687-4f45-9708-019B960494DF}">
-                <a14:hiddenLine xmlns="" xmlns:a16="http://schemas.microsoft.com/office/drawing/2014/main" xmlns:p14="http://schemas.microsoft.com/office/powerpoint/2010/main" xmlns:a14="http://schemas.microsoft.com/office/drawing/2010/main" w="9525">
+                <a14:hiddenLine xmlns:a14="http://schemas.microsoft.com/office/drawing/2010/main" xmlns:p14="http://schemas.microsoft.com/office/powerpoint/2010/main" xmlns:a16="http://schemas.microsoft.com/office/drawing/2014/main" xmlns="" w="9525">
                   <a:solidFill>
                     <a:srgbClr val="000000"/>
                   </a:solidFill>
@@ -29757,13 +29762,26 @@
           <a:p>
             <a:r>
               <a:rPr lang="en-US" dirty="0"/>
-              <a:t>Multilayer Neural Network: what is the </a:t>
+              <a:t>In reality: would </a:t>
+            </a:r>
+            <a:r>
+              <a:rPr lang="en-US" dirty="0" err="1"/>
+              <a:t>LinearSVC</a:t>
+            </a:r>
+            <a:r>
+              <a:rPr lang="en-US" dirty="0"/>
+              <a:t> be the </a:t>
             </a:r>
             <a:r>
               <a:rPr lang="en-US"/>
-              <a:t>input??</a:t>
+              <a:t>best choice??</a:t>
             </a:r>
-            <a:endParaRPr lang="en-US" dirty="0"/>
+          </a:p>
+          <a:p>
+            <a:r>
+              <a:rPr lang="en-US" dirty="0"/>
+              <a:t>Multilayer Neural Network: what is the input??</a:t>
+            </a:r>
           </a:p>
           <a:p>
             <a:r>
@@ -30040,7 +30058,7 @@
           <a:noFill/>
           <a:extLst>
             <a:ext uri="{909E8E84-426E-40dd-AFC4-6F175D3DCCD1}">
-              <a14:hiddenFill xmlns="" xmlns:a16="http://schemas.microsoft.com/office/drawing/2014/main" xmlns:p14="http://schemas.microsoft.com/office/powerpoint/2010/main" xmlns:a14="http://schemas.microsoft.com/office/drawing/2010/main">
+              <a14:hiddenFill xmlns:a14="http://schemas.microsoft.com/office/drawing/2010/main" xmlns:p14="http://schemas.microsoft.com/office/powerpoint/2010/main" xmlns:a16="http://schemas.microsoft.com/office/drawing/2014/main" xmlns="">
                 <a:solidFill>
                   <a:srgbClr val="FFFFFF"/>
                 </a:solidFill>
@@ -30299,7 +30317,7 @@
             </a:ln>
             <a:extLst>
               <a:ext uri="{91240B29-F687-4f45-9708-019B960494DF}">
-                <a14:hiddenLine xmlns="" xmlns:a16="http://schemas.microsoft.com/office/drawing/2014/main" xmlns:p14="http://schemas.microsoft.com/office/powerpoint/2010/main" xmlns:a14="http://schemas.microsoft.com/office/drawing/2010/main" w="9525">
+                <a14:hiddenLine xmlns:a14="http://schemas.microsoft.com/office/drawing/2010/main" xmlns:p14="http://schemas.microsoft.com/office/powerpoint/2010/main" xmlns:a16="http://schemas.microsoft.com/office/drawing/2014/main" xmlns="" w="9525">
                   <a:solidFill>
                     <a:srgbClr val="000000"/>
                   </a:solidFill>
@@ -30404,7 +30422,7 @@
             </a:ln>
             <a:extLst>
               <a:ext uri="{91240B29-F687-4f45-9708-019B960494DF}">
-                <a14:hiddenLine xmlns="" xmlns:a16="http://schemas.microsoft.com/office/drawing/2014/main" xmlns:p14="http://schemas.microsoft.com/office/powerpoint/2010/main" xmlns:a14="http://schemas.microsoft.com/office/drawing/2010/main" w="9525">
+                <a14:hiddenLine xmlns:a14="http://schemas.microsoft.com/office/drawing/2010/main" xmlns:p14="http://schemas.microsoft.com/office/powerpoint/2010/main" xmlns:a16="http://schemas.microsoft.com/office/drawing/2014/main" xmlns="" w="9525">
                   <a:solidFill>
                     <a:srgbClr val="000000"/>
                   </a:solidFill>
@@ -30509,7 +30527,7 @@
             </a:ln>
             <a:extLst>
               <a:ext uri="{91240B29-F687-4f45-9708-019B960494DF}">
-                <a14:hiddenLine xmlns="" xmlns:a16="http://schemas.microsoft.com/office/drawing/2014/main" xmlns:p14="http://schemas.microsoft.com/office/powerpoint/2010/main" xmlns:a14="http://schemas.microsoft.com/office/drawing/2010/main" w="9525">
+                <a14:hiddenLine xmlns:a14="http://schemas.microsoft.com/office/drawing/2010/main" xmlns:p14="http://schemas.microsoft.com/office/powerpoint/2010/main" xmlns:a16="http://schemas.microsoft.com/office/drawing/2014/main" xmlns="" w="9525">
                   <a:solidFill>
                     <a:srgbClr val="000000"/>
                   </a:solidFill>
@@ -30586,7 +30604,7 @@
             </a:ln>
             <a:extLst>
               <a:ext uri="{91240B29-F687-4f45-9708-019B960494DF}">
-                <a14:hiddenLine xmlns="" xmlns:a16="http://schemas.microsoft.com/office/drawing/2014/main" xmlns:p14="http://schemas.microsoft.com/office/powerpoint/2010/main" xmlns:a14="http://schemas.microsoft.com/office/drawing/2010/main" w="9525">
+                <a14:hiddenLine xmlns:a14="http://schemas.microsoft.com/office/drawing/2010/main" xmlns:p14="http://schemas.microsoft.com/office/powerpoint/2010/main" xmlns:a16="http://schemas.microsoft.com/office/drawing/2014/main" xmlns="" w="9525">
                   <a:solidFill>
                     <a:srgbClr val="000000"/>
                   </a:solidFill>
@@ -30691,7 +30709,7 @@
             </a:ln>
             <a:extLst>
               <a:ext uri="{91240B29-F687-4f45-9708-019B960494DF}">
-                <a14:hiddenLine xmlns="" xmlns:a16="http://schemas.microsoft.com/office/drawing/2014/main" xmlns:p14="http://schemas.microsoft.com/office/powerpoint/2010/main" xmlns:a14="http://schemas.microsoft.com/office/drawing/2010/main" w="9525">
+                <a14:hiddenLine xmlns:a14="http://schemas.microsoft.com/office/drawing/2010/main" xmlns:p14="http://schemas.microsoft.com/office/powerpoint/2010/main" xmlns:a16="http://schemas.microsoft.com/office/drawing/2014/main" xmlns="" w="9525">
                   <a:solidFill>
                     <a:srgbClr val="000000"/>
                   </a:solidFill>
@@ -30768,7 +30786,7 @@
             </a:ln>
             <a:extLst>
               <a:ext uri="{91240B29-F687-4f45-9708-019B960494DF}">
-                <a14:hiddenLine xmlns="" xmlns:a16="http://schemas.microsoft.com/office/drawing/2014/main" xmlns:p14="http://schemas.microsoft.com/office/powerpoint/2010/main" xmlns:a14="http://schemas.microsoft.com/office/drawing/2010/main" w="9525">
+                <a14:hiddenLine xmlns:a14="http://schemas.microsoft.com/office/drawing/2010/main" xmlns:p14="http://schemas.microsoft.com/office/powerpoint/2010/main" xmlns:a16="http://schemas.microsoft.com/office/drawing/2014/main" xmlns="" w="9525">
                   <a:solidFill>
                     <a:srgbClr val="000000"/>
                   </a:solidFill>
@@ -30845,7 +30863,7 @@
             </a:ln>
             <a:extLst>
               <a:ext uri="{91240B29-F687-4f45-9708-019B960494DF}">
-                <a14:hiddenLine xmlns="" xmlns:a16="http://schemas.microsoft.com/office/drawing/2014/main" xmlns:p14="http://schemas.microsoft.com/office/powerpoint/2010/main" xmlns:a14="http://schemas.microsoft.com/office/drawing/2010/main" w="9525">
+                <a14:hiddenLine xmlns:a14="http://schemas.microsoft.com/office/drawing/2010/main" xmlns:p14="http://schemas.microsoft.com/office/powerpoint/2010/main" xmlns:a16="http://schemas.microsoft.com/office/drawing/2014/main" xmlns="" w="9525">
                   <a:solidFill>
                     <a:srgbClr val="000000"/>
                   </a:solidFill>
@@ -30950,7 +30968,7 @@
             </a:ln>
             <a:extLst>
               <a:ext uri="{91240B29-F687-4f45-9708-019B960494DF}">
-                <a14:hiddenLine xmlns="" xmlns:a16="http://schemas.microsoft.com/office/drawing/2014/main" xmlns:p14="http://schemas.microsoft.com/office/powerpoint/2010/main" xmlns:a14="http://schemas.microsoft.com/office/drawing/2010/main" w="9525">
+                <a14:hiddenLine xmlns:a14="http://schemas.microsoft.com/office/drawing/2010/main" xmlns:p14="http://schemas.microsoft.com/office/powerpoint/2010/main" xmlns:a16="http://schemas.microsoft.com/office/drawing/2014/main" xmlns="" w="9525">
                   <a:solidFill>
                     <a:srgbClr val="000000"/>
                   </a:solidFill>
@@ -31055,7 +31073,7 @@
             </a:ln>
             <a:extLst>
               <a:ext uri="{91240B29-F687-4f45-9708-019B960494DF}">
-                <a14:hiddenLine xmlns="" xmlns:a16="http://schemas.microsoft.com/office/drawing/2014/main" xmlns:p14="http://schemas.microsoft.com/office/powerpoint/2010/main" xmlns:a14="http://schemas.microsoft.com/office/drawing/2010/main" w="9525">
+                <a14:hiddenLine xmlns:a14="http://schemas.microsoft.com/office/drawing/2010/main" xmlns:p14="http://schemas.microsoft.com/office/powerpoint/2010/main" xmlns:a16="http://schemas.microsoft.com/office/drawing/2014/main" xmlns="" w="9525">
                   <a:solidFill>
                     <a:srgbClr val="000000"/>
                   </a:solidFill>
@@ -31132,7 +31150,7 @@
             </a:ln>
             <a:extLst>
               <a:ext uri="{91240B29-F687-4f45-9708-019B960494DF}">
-                <a14:hiddenLine xmlns="" xmlns:a16="http://schemas.microsoft.com/office/drawing/2014/main" xmlns:p14="http://schemas.microsoft.com/office/powerpoint/2010/main" xmlns:a14="http://schemas.microsoft.com/office/drawing/2010/main" w="9525">
+                <a14:hiddenLine xmlns:a14="http://schemas.microsoft.com/office/drawing/2010/main" xmlns:p14="http://schemas.microsoft.com/office/powerpoint/2010/main" xmlns:a16="http://schemas.microsoft.com/office/drawing/2014/main" xmlns="" w="9525">
                   <a:solidFill>
                     <a:srgbClr val="000000"/>
                   </a:solidFill>
@@ -31257,7 +31275,7 @@
             </a:ln>
             <a:extLst>
               <a:ext uri="{91240B29-F687-4f45-9708-019B960494DF}">
-                <a14:hiddenLine xmlns="" xmlns:a16="http://schemas.microsoft.com/office/drawing/2014/main" xmlns:p14="http://schemas.microsoft.com/office/powerpoint/2010/main" xmlns:a14="http://schemas.microsoft.com/office/drawing/2010/main" w="9525">
+                <a14:hiddenLine xmlns:a14="http://schemas.microsoft.com/office/drawing/2010/main" xmlns:p14="http://schemas.microsoft.com/office/powerpoint/2010/main" xmlns:a16="http://schemas.microsoft.com/office/drawing/2014/main" xmlns="" w="9525">
                   <a:solidFill>
                     <a:srgbClr val="000000"/>
                   </a:solidFill>
@@ -31371,7 +31389,7 @@
             </a:ln>
             <a:extLst>
               <a:ext uri="{91240B29-F687-4f45-9708-019B960494DF}">
-                <a14:hiddenLine xmlns="" xmlns:a16="http://schemas.microsoft.com/office/drawing/2014/main" xmlns:p14="http://schemas.microsoft.com/office/powerpoint/2010/main" xmlns:a14="http://schemas.microsoft.com/office/drawing/2010/main" w="9525">
+                <a14:hiddenLine xmlns:a14="http://schemas.microsoft.com/office/drawing/2010/main" xmlns:p14="http://schemas.microsoft.com/office/powerpoint/2010/main" xmlns:a16="http://schemas.microsoft.com/office/drawing/2014/main" xmlns="" w="9525">
                   <a:solidFill>
                     <a:srgbClr val="000000"/>
                   </a:solidFill>
@@ -31448,7 +31466,7 @@
             </a:ln>
             <a:extLst>
               <a:ext uri="{91240B29-F687-4f45-9708-019B960494DF}">
-                <a14:hiddenLine xmlns="" xmlns:a16="http://schemas.microsoft.com/office/drawing/2014/main" xmlns:p14="http://schemas.microsoft.com/office/powerpoint/2010/main" xmlns:a14="http://schemas.microsoft.com/office/drawing/2010/main" w="9525">
+                <a14:hiddenLine xmlns:a14="http://schemas.microsoft.com/office/drawing/2010/main" xmlns:p14="http://schemas.microsoft.com/office/powerpoint/2010/main" xmlns:a16="http://schemas.microsoft.com/office/drawing/2014/main" xmlns="" w="9525">
                   <a:solidFill>
                     <a:srgbClr val="000000"/>
                   </a:solidFill>
@@ -31525,7 +31543,7 @@
             </a:ln>
             <a:extLst>
               <a:ext uri="{91240B29-F687-4f45-9708-019B960494DF}">
-                <a14:hiddenLine xmlns="" xmlns:a16="http://schemas.microsoft.com/office/drawing/2014/main" xmlns:p14="http://schemas.microsoft.com/office/powerpoint/2010/main" xmlns:a14="http://schemas.microsoft.com/office/drawing/2010/main" w="9525">
+                <a14:hiddenLine xmlns:a14="http://schemas.microsoft.com/office/drawing/2010/main" xmlns:p14="http://schemas.microsoft.com/office/powerpoint/2010/main" xmlns:a16="http://schemas.microsoft.com/office/drawing/2014/main" xmlns="" w="9525">
                   <a:solidFill>
                     <a:srgbClr val="000000"/>
                   </a:solidFill>
@@ -31630,7 +31648,7 @@
             </a:ln>
             <a:extLst>
               <a:ext uri="{91240B29-F687-4f45-9708-019B960494DF}">
-                <a14:hiddenLine xmlns="" xmlns:a16="http://schemas.microsoft.com/office/drawing/2014/main" xmlns:p14="http://schemas.microsoft.com/office/powerpoint/2010/main" xmlns:a14="http://schemas.microsoft.com/office/drawing/2010/main" w="9525">
+                <a14:hiddenLine xmlns:a14="http://schemas.microsoft.com/office/drawing/2010/main" xmlns:p14="http://schemas.microsoft.com/office/powerpoint/2010/main" xmlns:a16="http://schemas.microsoft.com/office/drawing/2014/main" xmlns="" w="9525">
                   <a:solidFill>
                     <a:srgbClr val="000000"/>
                   </a:solidFill>
@@ -31679,7 +31697,7 @@
             </a:ln>
             <a:extLst>
               <a:ext uri="{91240B29-F687-4f45-9708-019B960494DF}">
-                <a14:hiddenLine xmlns="" xmlns:a16="http://schemas.microsoft.com/office/drawing/2014/main" xmlns:p14="http://schemas.microsoft.com/office/powerpoint/2010/main" xmlns:a14="http://schemas.microsoft.com/office/drawing/2010/main" w="9525">
+                <a14:hiddenLine xmlns:a14="http://schemas.microsoft.com/office/drawing/2010/main" xmlns:p14="http://schemas.microsoft.com/office/powerpoint/2010/main" xmlns:a16="http://schemas.microsoft.com/office/drawing/2014/main" xmlns="" w="9525">
                   <a:solidFill>
                     <a:srgbClr val="000000"/>
                   </a:solidFill>
@@ -31759,7 +31777,7 @@
             </a:ln>
             <a:extLst>
               <a:ext uri="{91240B29-F687-4f45-9708-019B960494DF}">
-                <a14:hiddenLine xmlns="" xmlns:a16="http://schemas.microsoft.com/office/drawing/2014/main" xmlns:p14="http://schemas.microsoft.com/office/powerpoint/2010/main" xmlns:a14="http://schemas.microsoft.com/office/drawing/2010/main" w="9525">
+                <a14:hiddenLine xmlns:a14="http://schemas.microsoft.com/office/drawing/2010/main" xmlns:p14="http://schemas.microsoft.com/office/powerpoint/2010/main" xmlns:a16="http://schemas.microsoft.com/office/drawing/2014/main" xmlns="" w="9525">
                   <a:solidFill>
                     <a:srgbClr val="000000"/>
                   </a:solidFill>
@@ -31864,7 +31882,7 @@
             </a:ln>
             <a:extLst>
               <a:ext uri="{91240B29-F687-4f45-9708-019B960494DF}">
-                <a14:hiddenLine xmlns="" xmlns:a16="http://schemas.microsoft.com/office/drawing/2014/main" xmlns:p14="http://schemas.microsoft.com/office/powerpoint/2010/main" xmlns:a14="http://schemas.microsoft.com/office/drawing/2010/main" w="9525">
+                <a14:hiddenLine xmlns:a14="http://schemas.microsoft.com/office/drawing/2010/main" xmlns:p14="http://schemas.microsoft.com/office/powerpoint/2010/main" xmlns:a16="http://schemas.microsoft.com/office/drawing/2014/main" xmlns="" w="9525">
                   <a:solidFill>
                     <a:srgbClr val="000000"/>
                   </a:solidFill>
@@ -31941,7 +31959,7 @@
             </a:ln>
             <a:extLst>
               <a:ext uri="{91240B29-F687-4f45-9708-019B960494DF}">
-                <a14:hiddenLine xmlns="" xmlns:a16="http://schemas.microsoft.com/office/drawing/2014/main" xmlns:p14="http://schemas.microsoft.com/office/powerpoint/2010/main" xmlns:a14="http://schemas.microsoft.com/office/drawing/2010/main" w="9525">
+                <a14:hiddenLine xmlns:a14="http://schemas.microsoft.com/office/drawing/2010/main" xmlns:p14="http://schemas.microsoft.com/office/powerpoint/2010/main" xmlns:a16="http://schemas.microsoft.com/office/drawing/2014/main" xmlns="" w="9525">
                   <a:solidFill>
                     <a:srgbClr val="000000"/>
                   </a:solidFill>
@@ -32046,7 +32064,7 @@
             </a:ln>
             <a:extLst>
               <a:ext uri="{91240B29-F687-4f45-9708-019B960494DF}">
-                <a14:hiddenLine xmlns="" xmlns:a16="http://schemas.microsoft.com/office/drawing/2014/main" xmlns:p14="http://schemas.microsoft.com/office/powerpoint/2010/main" xmlns:a14="http://schemas.microsoft.com/office/drawing/2010/main" w="9525">
+                <a14:hiddenLine xmlns:a14="http://schemas.microsoft.com/office/drawing/2010/main" xmlns:p14="http://schemas.microsoft.com/office/powerpoint/2010/main" xmlns:a16="http://schemas.microsoft.com/office/drawing/2014/main" xmlns="" w="9525">
                   <a:solidFill>
                     <a:srgbClr val="000000"/>
                   </a:solidFill>
@@ -32126,7 +32144,7 @@
             </a:ln>
             <a:extLst>
               <a:ext uri="{91240B29-F687-4f45-9708-019B960494DF}">
-                <a14:hiddenLine xmlns="" xmlns:a16="http://schemas.microsoft.com/office/drawing/2014/main" xmlns:p14="http://schemas.microsoft.com/office/powerpoint/2010/main" xmlns:a14="http://schemas.microsoft.com/office/drawing/2010/main" w="9525">
+                <a14:hiddenLine xmlns:a14="http://schemas.microsoft.com/office/drawing/2010/main" xmlns:p14="http://schemas.microsoft.com/office/powerpoint/2010/main" xmlns:a16="http://schemas.microsoft.com/office/drawing/2014/main" xmlns="" w="9525">
                   <a:solidFill>
                     <a:srgbClr val="000000"/>
                   </a:solidFill>
@@ -32203,7 +32221,7 @@
             </a:ln>
             <a:extLst>
               <a:ext uri="{91240B29-F687-4f45-9708-019B960494DF}">
-                <a14:hiddenLine xmlns="" xmlns:a16="http://schemas.microsoft.com/office/drawing/2014/main" xmlns:p14="http://schemas.microsoft.com/office/powerpoint/2010/main" xmlns:a14="http://schemas.microsoft.com/office/drawing/2010/main" w="9525">
+                <a14:hiddenLine xmlns:a14="http://schemas.microsoft.com/office/drawing/2010/main" xmlns:p14="http://schemas.microsoft.com/office/powerpoint/2010/main" xmlns:a16="http://schemas.microsoft.com/office/drawing/2014/main" xmlns="" w="9525">
                   <a:solidFill>
                     <a:srgbClr val="000000"/>
                   </a:solidFill>
@@ -32308,7 +32326,7 @@
             </a:ln>
             <a:extLst>
               <a:ext uri="{91240B29-F687-4f45-9708-019B960494DF}">
-                <a14:hiddenLine xmlns="" xmlns:a16="http://schemas.microsoft.com/office/drawing/2014/main" xmlns:p14="http://schemas.microsoft.com/office/powerpoint/2010/main" xmlns:a14="http://schemas.microsoft.com/office/drawing/2010/main" w="9525">
+                <a14:hiddenLine xmlns:a14="http://schemas.microsoft.com/office/drawing/2010/main" xmlns:p14="http://schemas.microsoft.com/office/powerpoint/2010/main" xmlns:a16="http://schemas.microsoft.com/office/drawing/2014/main" xmlns="" w="9525">
                   <a:solidFill>
                     <a:srgbClr val="000000"/>
                   </a:solidFill>
@@ -32413,7 +32431,7 @@
             </a:ln>
             <a:extLst>
               <a:ext uri="{91240B29-F687-4f45-9708-019B960494DF}">
-                <a14:hiddenLine xmlns="" xmlns:a16="http://schemas.microsoft.com/office/drawing/2014/main" xmlns:p14="http://schemas.microsoft.com/office/powerpoint/2010/main" xmlns:a14="http://schemas.microsoft.com/office/drawing/2010/main" w="9525">
+                <a14:hiddenLine xmlns:a14="http://schemas.microsoft.com/office/drawing/2010/main" xmlns:p14="http://schemas.microsoft.com/office/powerpoint/2010/main" xmlns:a16="http://schemas.microsoft.com/office/drawing/2014/main" xmlns="" w="9525">
                   <a:solidFill>
                     <a:srgbClr val="000000"/>
                   </a:solidFill>
@@ -32493,7 +32511,7 @@
             </a:ln>
             <a:extLst>
               <a:ext uri="{91240B29-F687-4f45-9708-019B960494DF}">
-                <a14:hiddenLine xmlns="" xmlns:a16="http://schemas.microsoft.com/office/drawing/2014/main" xmlns:p14="http://schemas.microsoft.com/office/powerpoint/2010/main" xmlns:a14="http://schemas.microsoft.com/office/drawing/2010/main" w="9525">
+                <a14:hiddenLine xmlns:a14="http://schemas.microsoft.com/office/drawing/2010/main" xmlns:p14="http://schemas.microsoft.com/office/powerpoint/2010/main" xmlns:a16="http://schemas.microsoft.com/office/drawing/2014/main" xmlns="" w="9525">
                   <a:solidFill>
                     <a:srgbClr val="000000"/>
                   </a:solidFill>
@@ -32628,7 +32646,7 @@
             </a:ln>
             <a:extLst>
               <a:ext uri="{91240B29-F687-4f45-9708-019B960494DF}">
-                <a14:hiddenLine xmlns="" xmlns:a16="http://schemas.microsoft.com/office/drawing/2014/main" xmlns:p14="http://schemas.microsoft.com/office/powerpoint/2010/main" xmlns:a14="http://schemas.microsoft.com/office/drawing/2010/main" w="9525">
+                <a14:hiddenLine xmlns:a14="http://schemas.microsoft.com/office/drawing/2010/main" xmlns:p14="http://schemas.microsoft.com/office/powerpoint/2010/main" xmlns:a16="http://schemas.microsoft.com/office/drawing/2014/main" xmlns="" w="9525">
                   <a:solidFill>
                     <a:srgbClr val="000000"/>
                   </a:solidFill>
@@ -32930,7 +32948,7 @@
           <a:noFill/>
           <a:extLst>
             <a:ext uri="{909E8E84-426E-40dd-AFC4-6F175D3DCCD1}">
-              <a14:hiddenFill xmlns="" xmlns:a16="http://schemas.microsoft.com/office/drawing/2014/main" xmlns:p14="http://schemas.microsoft.com/office/powerpoint/2010/main" xmlns:a14="http://schemas.microsoft.com/office/drawing/2010/main">
+              <a14:hiddenFill xmlns:a14="http://schemas.microsoft.com/office/drawing/2010/main" xmlns:p14="http://schemas.microsoft.com/office/powerpoint/2010/main" xmlns:a16="http://schemas.microsoft.com/office/drawing/2014/main" xmlns="">
                 <a:solidFill>
                   <a:srgbClr val="FFFFFF"/>
                 </a:solidFill>
@@ -33108,7 +33126,7 @@
             </a:ln>
             <a:extLst>
               <a:ext uri="{91240B29-F687-4f45-9708-019B960494DF}">
-                <a14:hiddenLine xmlns="" xmlns:a16="http://schemas.microsoft.com/office/drawing/2014/main" xmlns:p14="http://schemas.microsoft.com/office/powerpoint/2010/main" xmlns:a14="http://schemas.microsoft.com/office/drawing/2010/main" w="9525">
+                <a14:hiddenLine xmlns:a14="http://schemas.microsoft.com/office/drawing/2010/main" xmlns:p14="http://schemas.microsoft.com/office/powerpoint/2010/main" xmlns:a16="http://schemas.microsoft.com/office/drawing/2014/main" xmlns="" w="9525">
                   <a:solidFill>
                     <a:srgbClr val="000000"/>
                   </a:solidFill>
@@ -33213,7 +33231,7 @@
             </a:ln>
             <a:extLst>
               <a:ext uri="{91240B29-F687-4f45-9708-019B960494DF}">
-                <a14:hiddenLine xmlns="" xmlns:a16="http://schemas.microsoft.com/office/drawing/2014/main" xmlns:p14="http://schemas.microsoft.com/office/powerpoint/2010/main" xmlns:a14="http://schemas.microsoft.com/office/drawing/2010/main" w="9525">
+                <a14:hiddenLine xmlns:a14="http://schemas.microsoft.com/office/drawing/2010/main" xmlns:p14="http://schemas.microsoft.com/office/powerpoint/2010/main" xmlns:a16="http://schemas.microsoft.com/office/drawing/2014/main" xmlns="" w="9525">
                   <a:solidFill>
                     <a:srgbClr val="000000"/>
                   </a:solidFill>
@@ -33318,7 +33336,7 @@
             </a:ln>
             <a:extLst>
               <a:ext uri="{91240B29-F687-4f45-9708-019B960494DF}">
-                <a14:hiddenLine xmlns="" xmlns:a16="http://schemas.microsoft.com/office/drawing/2014/main" xmlns:p14="http://schemas.microsoft.com/office/powerpoint/2010/main" xmlns:a14="http://schemas.microsoft.com/office/drawing/2010/main" w="9525">
+                <a14:hiddenLine xmlns:a14="http://schemas.microsoft.com/office/drawing/2010/main" xmlns:p14="http://schemas.microsoft.com/office/powerpoint/2010/main" xmlns:a16="http://schemas.microsoft.com/office/drawing/2014/main" xmlns="" w="9525">
                   <a:solidFill>
                     <a:srgbClr val="000000"/>
                   </a:solidFill>
@@ -33395,7 +33413,7 @@
             </a:ln>
             <a:extLst>
               <a:ext uri="{91240B29-F687-4f45-9708-019B960494DF}">
-                <a14:hiddenLine xmlns="" xmlns:a16="http://schemas.microsoft.com/office/drawing/2014/main" xmlns:p14="http://schemas.microsoft.com/office/powerpoint/2010/main" xmlns:a14="http://schemas.microsoft.com/office/drawing/2010/main" w="9525">
+                <a14:hiddenLine xmlns:a14="http://schemas.microsoft.com/office/drawing/2010/main" xmlns:p14="http://schemas.microsoft.com/office/powerpoint/2010/main" xmlns:a16="http://schemas.microsoft.com/office/drawing/2014/main" xmlns="" w="9525">
                   <a:solidFill>
                     <a:srgbClr val="000000"/>
                   </a:solidFill>
@@ -33500,7 +33518,7 @@
             </a:ln>
             <a:extLst>
               <a:ext uri="{91240B29-F687-4f45-9708-019B960494DF}">
-                <a14:hiddenLine xmlns="" xmlns:a16="http://schemas.microsoft.com/office/drawing/2014/main" xmlns:p14="http://schemas.microsoft.com/office/powerpoint/2010/main" xmlns:a14="http://schemas.microsoft.com/office/drawing/2010/main" w="9525">
+                <a14:hiddenLine xmlns:a14="http://schemas.microsoft.com/office/drawing/2010/main" xmlns:p14="http://schemas.microsoft.com/office/powerpoint/2010/main" xmlns:a16="http://schemas.microsoft.com/office/drawing/2014/main" xmlns="" w="9525">
                   <a:solidFill>
                     <a:srgbClr val="000000"/>
                   </a:solidFill>
@@ -33577,7 +33595,7 @@
             </a:ln>
             <a:extLst>
               <a:ext uri="{91240B29-F687-4f45-9708-019B960494DF}">
-                <a14:hiddenLine xmlns="" xmlns:a16="http://schemas.microsoft.com/office/drawing/2014/main" xmlns:p14="http://schemas.microsoft.com/office/powerpoint/2010/main" xmlns:a14="http://schemas.microsoft.com/office/drawing/2010/main" w="9525">
+                <a14:hiddenLine xmlns:a14="http://schemas.microsoft.com/office/drawing/2010/main" xmlns:p14="http://schemas.microsoft.com/office/powerpoint/2010/main" xmlns:a16="http://schemas.microsoft.com/office/drawing/2014/main" xmlns="" w="9525">
                   <a:solidFill>
                     <a:srgbClr val="000000"/>
                   </a:solidFill>
@@ -33654,7 +33672,7 @@
             </a:ln>
             <a:extLst>
               <a:ext uri="{91240B29-F687-4f45-9708-019B960494DF}">
-                <a14:hiddenLine xmlns="" xmlns:a16="http://schemas.microsoft.com/office/drawing/2014/main" xmlns:p14="http://schemas.microsoft.com/office/powerpoint/2010/main" xmlns:a14="http://schemas.microsoft.com/office/drawing/2010/main" w="9525">
+                <a14:hiddenLine xmlns:a14="http://schemas.microsoft.com/office/drawing/2010/main" xmlns:p14="http://schemas.microsoft.com/office/powerpoint/2010/main" xmlns:a16="http://schemas.microsoft.com/office/drawing/2014/main" xmlns="" w="9525">
                   <a:solidFill>
                     <a:srgbClr val="000000"/>
                   </a:solidFill>
@@ -33759,7 +33777,7 @@
             </a:ln>
             <a:extLst>
               <a:ext uri="{91240B29-F687-4f45-9708-019B960494DF}">
-                <a14:hiddenLine xmlns="" xmlns:a16="http://schemas.microsoft.com/office/drawing/2014/main" xmlns:p14="http://schemas.microsoft.com/office/powerpoint/2010/main" xmlns:a14="http://schemas.microsoft.com/office/drawing/2010/main" w="9525">
+                <a14:hiddenLine xmlns:a14="http://schemas.microsoft.com/office/drawing/2010/main" xmlns:p14="http://schemas.microsoft.com/office/powerpoint/2010/main" xmlns:a16="http://schemas.microsoft.com/office/drawing/2014/main" xmlns="" w="9525">
                   <a:solidFill>
                     <a:srgbClr val="000000"/>
                   </a:solidFill>
@@ -33864,7 +33882,7 @@
             </a:ln>
             <a:extLst>
               <a:ext uri="{91240B29-F687-4f45-9708-019B960494DF}">
-                <a14:hiddenLine xmlns="" xmlns:a16="http://schemas.microsoft.com/office/drawing/2014/main" xmlns:p14="http://schemas.microsoft.com/office/powerpoint/2010/main" xmlns:a14="http://schemas.microsoft.com/office/drawing/2010/main" w="9525">
+                <a14:hiddenLine xmlns:a14="http://schemas.microsoft.com/office/drawing/2010/main" xmlns:p14="http://schemas.microsoft.com/office/powerpoint/2010/main" xmlns:a16="http://schemas.microsoft.com/office/drawing/2014/main" xmlns="" w="9525">
                   <a:solidFill>
                     <a:srgbClr val="000000"/>
                   </a:solidFill>
@@ -33941,7 +33959,7 @@
             </a:ln>
             <a:extLst>
               <a:ext uri="{91240B29-F687-4f45-9708-019B960494DF}">
-                <a14:hiddenLine xmlns="" xmlns:a16="http://schemas.microsoft.com/office/drawing/2014/main" xmlns:p14="http://schemas.microsoft.com/office/powerpoint/2010/main" xmlns:a14="http://schemas.microsoft.com/office/drawing/2010/main" w="9525">
+                <a14:hiddenLine xmlns:a14="http://schemas.microsoft.com/office/drawing/2010/main" xmlns:p14="http://schemas.microsoft.com/office/powerpoint/2010/main" xmlns:a16="http://schemas.microsoft.com/office/drawing/2014/main" xmlns="" w="9525">
                   <a:solidFill>
                     <a:srgbClr val="000000"/>
                   </a:solidFill>
@@ -34066,7 +34084,7 @@
             </a:ln>
             <a:extLst>
               <a:ext uri="{91240B29-F687-4f45-9708-019B960494DF}">
-                <a14:hiddenLine xmlns="" xmlns:a16="http://schemas.microsoft.com/office/drawing/2014/main" xmlns:p14="http://schemas.microsoft.com/office/powerpoint/2010/main" xmlns:a14="http://schemas.microsoft.com/office/drawing/2010/main" w="9525">
+                <a14:hiddenLine xmlns:a14="http://schemas.microsoft.com/office/drawing/2010/main" xmlns:p14="http://schemas.microsoft.com/office/powerpoint/2010/main" xmlns:a16="http://schemas.microsoft.com/office/drawing/2014/main" xmlns="" w="9525">
                   <a:solidFill>
                     <a:srgbClr val="000000"/>
                   </a:solidFill>
@@ -34180,7 +34198,7 @@
             </a:ln>
             <a:extLst>
               <a:ext uri="{91240B29-F687-4f45-9708-019B960494DF}">
-                <a14:hiddenLine xmlns="" xmlns:a16="http://schemas.microsoft.com/office/drawing/2014/main" xmlns:p14="http://schemas.microsoft.com/office/powerpoint/2010/main" xmlns:a14="http://schemas.microsoft.com/office/drawing/2010/main" w="9525">
+                <a14:hiddenLine xmlns:a14="http://schemas.microsoft.com/office/drawing/2010/main" xmlns:p14="http://schemas.microsoft.com/office/powerpoint/2010/main" xmlns:a16="http://schemas.microsoft.com/office/drawing/2014/main" xmlns="" w="9525">
                   <a:solidFill>
                     <a:srgbClr val="000000"/>
                   </a:solidFill>
@@ -34257,7 +34275,7 @@
             </a:ln>
             <a:extLst>
               <a:ext uri="{91240B29-F687-4f45-9708-019B960494DF}">
-                <a14:hiddenLine xmlns="" xmlns:a16="http://schemas.microsoft.com/office/drawing/2014/main" xmlns:p14="http://schemas.microsoft.com/office/powerpoint/2010/main" xmlns:a14="http://schemas.microsoft.com/office/drawing/2010/main" w="9525">
+                <a14:hiddenLine xmlns:a14="http://schemas.microsoft.com/office/drawing/2010/main" xmlns:p14="http://schemas.microsoft.com/office/powerpoint/2010/main" xmlns:a16="http://schemas.microsoft.com/office/drawing/2014/main" xmlns="" w="9525">
                   <a:solidFill>
                     <a:srgbClr val="000000"/>
                   </a:solidFill>
@@ -34334,7 +34352,7 @@
             </a:ln>
             <a:extLst>
               <a:ext uri="{91240B29-F687-4f45-9708-019B960494DF}">
-                <a14:hiddenLine xmlns="" xmlns:a16="http://schemas.microsoft.com/office/drawing/2014/main" xmlns:p14="http://schemas.microsoft.com/office/powerpoint/2010/main" xmlns:a14="http://schemas.microsoft.com/office/drawing/2010/main" w="9525">
+                <a14:hiddenLine xmlns:a14="http://schemas.microsoft.com/office/drawing/2010/main" xmlns:p14="http://schemas.microsoft.com/office/powerpoint/2010/main" xmlns:a16="http://schemas.microsoft.com/office/drawing/2014/main" xmlns="" w="9525">
                   <a:solidFill>
                     <a:srgbClr val="000000"/>
                   </a:solidFill>
@@ -34439,7 +34457,7 @@
             </a:ln>
             <a:extLst>
               <a:ext uri="{91240B29-F687-4f45-9708-019B960494DF}">
-                <a14:hiddenLine xmlns="" xmlns:a16="http://schemas.microsoft.com/office/drawing/2014/main" xmlns:p14="http://schemas.microsoft.com/office/powerpoint/2010/main" xmlns:a14="http://schemas.microsoft.com/office/drawing/2010/main" w="9525">
+                <a14:hiddenLine xmlns:a14="http://schemas.microsoft.com/office/drawing/2010/main" xmlns:p14="http://schemas.microsoft.com/office/powerpoint/2010/main" xmlns:a16="http://schemas.microsoft.com/office/drawing/2014/main" xmlns="" w="9525">
                   <a:solidFill>
                     <a:srgbClr val="000000"/>
                   </a:solidFill>
@@ -34488,7 +34506,7 @@
             </a:ln>
             <a:extLst>
               <a:ext uri="{91240B29-F687-4f45-9708-019B960494DF}">
-                <a14:hiddenLine xmlns="" xmlns:a16="http://schemas.microsoft.com/office/drawing/2014/main" xmlns:p14="http://schemas.microsoft.com/office/powerpoint/2010/main" xmlns:a14="http://schemas.microsoft.com/office/drawing/2010/main" w="9525">
+                <a14:hiddenLine xmlns:a14="http://schemas.microsoft.com/office/drawing/2010/main" xmlns:p14="http://schemas.microsoft.com/office/powerpoint/2010/main" xmlns:a16="http://schemas.microsoft.com/office/drawing/2014/main" xmlns="" w="9525">
                   <a:solidFill>
                     <a:srgbClr val="000000"/>
                   </a:solidFill>
@@ -34568,7 +34586,7 @@
             </a:ln>
             <a:extLst>
               <a:ext uri="{91240B29-F687-4f45-9708-019B960494DF}">
-                <a14:hiddenLine xmlns="" xmlns:a16="http://schemas.microsoft.com/office/drawing/2014/main" xmlns:p14="http://schemas.microsoft.com/office/powerpoint/2010/main" xmlns:a14="http://schemas.microsoft.com/office/drawing/2010/main" w="9525">
+                <a14:hiddenLine xmlns:a14="http://schemas.microsoft.com/office/drawing/2010/main" xmlns:p14="http://schemas.microsoft.com/office/powerpoint/2010/main" xmlns:a16="http://schemas.microsoft.com/office/drawing/2014/main" xmlns="" w="9525">
                   <a:solidFill>
                     <a:srgbClr val="000000"/>
                   </a:solidFill>
@@ -34673,7 +34691,7 @@
             </a:ln>
             <a:extLst>
               <a:ext uri="{91240B29-F687-4f45-9708-019B960494DF}">
-                <a14:hiddenLine xmlns="" xmlns:a16="http://schemas.microsoft.com/office/drawing/2014/main" xmlns:p14="http://schemas.microsoft.com/office/powerpoint/2010/main" xmlns:a14="http://schemas.microsoft.com/office/drawing/2010/main" w="9525">
+                <a14:hiddenLine xmlns:a14="http://schemas.microsoft.com/office/drawing/2010/main" xmlns:p14="http://schemas.microsoft.com/office/powerpoint/2010/main" xmlns:a16="http://schemas.microsoft.com/office/drawing/2014/main" xmlns="" w="9525">
                   <a:solidFill>
                     <a:srgbClr val="000000"/>
                   </a:solidFill>
@@ -34750,7 +34768,7 @@
             </a:ln>
             <a:extLst>
               <a:ext uri="{91240B29-F687-4f45-9708-019B960494DF}">
-                <a14:hiddenLine xmlns="" xmlns:a16="http://schemas.microsoft.com/office/drawing/2014/main" xmlns:p14="http://schemas.microsoft.com/office/powerpoint/2010/main" xmlns:a14="http://schemas.microsoft.com/office/drawing/2010/main" w="9525">
+                <a14:hiddenLine xmlns:a14="http://schemas.microsoft.com/office/drawing/2010/main" xmlns:p14="http://schemas.microsoft.com/office/powerpoint/2010/main" xmlns:a16="http://schemas.microsoft.com/office/drawing/2014/main" xmlns="" w="9525">
                   <a:solidFill>
                     <a:srgbClr val="000000"/>
                   </a:solidFill>
@@ -34855,7 +34873,7 @@
             </a:ln>
             <a:extLst>
               <a:ext uri="{91240B29-F687-4f45-9708-019B960494DF}">
-                <a14:hiddenLine xmlns="" xmlns:a16="http://schemas.microsoft.com/office/drawing/2014/main" xmlns:p14="http://schemas.microsoft.com/office/powerpoint/2010/main" xmlns:a14="http://schemas.microsoft.com/office/drawing/2010/main" w="9525">
+                <a14:hiddenLine xmlns:a14="http://schemas.microsoft.com/office/drawing/2010/main" xmlns:p14="http://schemas.microsoft.com/office/powerpoint/2010/main" xmlns:a16="http://schemas.microsoft.com/office/drawing/2014/main" xmlns="" w="9525">
                   <a:solidFill>
                     <a:srgbClr val="000000"/>
                   </a:solidFill>
@@ -34935,7 +34953,7 @@
             </a:ln>
             <a:extLst>
               <a:ext uri="{91240B29-F687-4f45-9708-019B960494DF}">
-                <a14:hiddenLine xmlns="" xmlns:a16="http://schemas.microsoft.com/office/drawing/2014/main" xmlns:p14="http://schemas.microsoft.com/office/powerpoint/2010/main" xmlns:a14="http://schemas.microsoft.com/office/drawing/2010/main" w="9525">
+                <a14:hiddenLine xmlns:a14="http://schemas.microsoft.com/office/drawing/2010/main" xmlns:p14="http://schemas.microsoft.com/office/powerpoint/2010/main" xmlns:a16="http://schemas.microsoft.com/office/drawing/2014/main" xmlns="" w="9525">
                   <a:solidFill>
                     <a:srgbClr val="000000"/>
                   </a:solidFill>
@@ -35012,7 +35030,7 @@
             </a:ln>
             <a:extLst>
               <a:ext uri="{91240B29-F687-4f45-9708-019B960494DF}">
-                <a14:hiddenLine xmlns="" xmlns:a16="http://schemas.microsoft.com/office/drawing/2014/main" xmlns:p14="http://schemas.microsoft.com/office/powerpoint/2010/main" xmlns:a14="http://schemas.microsoft.com/office/drawing/2010/main" w="9525">
+                <a14:hiddenLine xmlns:a14="http://schemas.microsoft.com/office/drawing/2010/main" xmlns:p14="http://schemas.microsoft.com/office/powerpoint/2010/main" xmlns:a16="http://schemas.microsoft.com/office/drawing/2014/main" xmlns="" w="9525">
                   <a:solidFill>
                     <a:srgbClr val="000000"/>
                   </a:solidFill>
@@ -35117,7 +35135,7 @@
             </a:ln>
             <a:extLst>
               <a:ext uri="{91240B29-F687-4f45-9708-019B960494DF}">
-                <a14:hiddenLine xmlns="" xmlns:a16="http://schemas.microsoft.com/office/drawing/2014/main" xmlns:p14="http://schemas.microsoft.com/office/powerpoint/2010/main" xmlns:a14="http://schemas.microsoft.com/office/drawing/2010/main" w="9525">
+                <a14:hiddenLine xmlns:a14="http://schemas.microsoft.com/office/drawing/2010/main" xmlns:p14="http://schemas.microsoft.com/office/powerpoint/2010/main" xmlns:a16="http://schemas.microsoft.com/office/drawing/2014/main" xmlns="" w="9525">
                   <a:solidFill>
                     <a:srgbClr val="000000"/>
                   </a:solidFill>
@@ -35222,7 +35240,7 @@
             </a:ln>
             <a:extLst>
               <a:ext uri="{91240B29-F687-4f45-9708-019B960494DF}">
-                <a14:hiddenLine xmlns="" xmlns:a16="http://schemas.microsoft.com/office/drawing/2014/main" xmlns:p14="http://schemas.microsoft.com/office/powerpoint/2010/main" xmlns:a14="http://schemas.microsoft.com/office/drawing/2010/main" w="9525">
+                <a14:hiddenLine xmlns:a14="http://schemas.microsoft.com/office/drawing/2010/main" xmlns:p14="http://schemas.microsoft.com/office/powerpoint/2010/main" xmlns:a16="http://schemas.microsoft.com/office/drawing/2014/main" xmlns="" w="9525">
                   <a:solidFill>
                     <a:srgbClr val="000000"/>
                   </a:solidFill>
@@ -35302,7 +35320,7 @@
             </a:ln>
             <a:extLst>
               <a:ext uri="{91240B29-F687-4f45-9708-019B960494DF}">
-                <a14:hiddenLine xmlns="" xmlns:a16="http://schemas.microsoft.com/office/drawing/2014/main" xmlns:p14="http://schemas.microsoft.com/office/powerpoint/2010/main" xmlns:a14="http://schemas.microsoft.com/office/drawing/2010/main" w="9525">
+                <a14:hiddenLine xmlns:a14="http://schemas.microsoft.com/office/drawing/2010/main" xmlns:p14="http://schemas.microsoft.com/office/powerpoint/2010/main" xmlns:a16="http://schemas.microsoft.com/office/drawing/2014/main" xmlns="" w="9525">
                   <a:solidFill>
                     <a:srgbClr val="000000"/>
                   </a:solidFill>
@@ -35437,7 +35455,7 @@
             </a:ln>
             <a:extLst>
               <a:ext uri="{91240B29-F687-4f45-9708-019B960494DF}">
-                <a14:hiddenLine xmlns="" xmlns:a16="http://schemas.microsoft.com/office/drawing/2014/main" xmlns:p14="http://schemas.microsoft.com/office/powerpoint/2010/main" xmlns:a14="http://schemas.microsoft.com/office/drawing/2010/main" w="9525">
+                <a14:hiddenLine xmlns:a14="http://schemas.microsoft.com/office/drawing/2010/main" xmlns:p14="http://schemas.microsoft.com/office/powerpoint/2010/main" xmlns:a16="http://schemas.microsoft.com/office/drawing/2014/main" xmlns="" w="9525">
                   <a:solidFill>
                     <a:srgbClr val="000000"/>
                   </a:solidFill>

</xml_diff>